<commit_message>
added mapper for collections
</commit_message>
<xml_diff>
--- a/follow.pptx
+++ b/follow.pptx
@@ -5,7 +5,7 @@
     <p:sldMasterId id="2147483648" r:id="rId1"/>
   </p:sldMasterIdLst>
   <p:notesMasterIdLst>
-    <p:notesMasterId r:id="rId17"/>
+    <p:notesMasterId r:id="rId18"/>
   </p:notesMasterIdLst>
   <p:sldIdLst>
     <p:sldId id="256" r:id="rId2"/>
@@ -22,7 +22,8 @@
     <p:sldId id="267" r:id="rId13"/>
     <p:sldId id="268" r:id="rId14"/>
     <p:sldId id="269" r:id="rId15"/>
-    <p:sldId id="270" r:id="rId16"/>
+    <p:sldId id="271" r:id="rId16"/>
+    <p:sldId id="270" r:id="rId17"/>
   </p:sldIdLst>
   <p:sldSz cx="9144000" cy="6858000" type="screen4x3"/>
   <p:notesSz cx="6858000" cy="9144000"/>
@@ -123,7 +124,7 @@
   </p:defaultTextStyle>
   <p:extLst>
     <p:ext uri="{521415D9-36F7-43E2-AB2F-B90AF26B5E84}">
-      <p14:sectionLst xmlns="" xmlns:p14="http://schemas.microsoft.com/office/powerpoint/2010/main">
+      <p14:sectionLst xmlns:p14="http://schemas.microsoft.com/office/powerpoint/2010/main" xmlns="">
         <p14:section name="Раздел по умолчанию" id="{91121F77-0F5E-48E1-881E-01F39738CC36}">
           <p14:sldIdLst>
             <p14:sldId id="256"/>
@@ -220,7 +221,7 @@
             <a:fld id="{4B545793-377F-4142-A84F-09455908919B}" type="datetimeFigureOut">
               <a:rPr lang="ru-RU" smtClean="0"/>
               <a:pPr/>
-              <a:t>21.11.2011</a:t>
+              <a:t>24.11.2011</a:t>
             </a:fld>
             <a:endParaRPr lang="ru-RU"/>
           </a:p>
@@ -389,7 +390,7 @@
     </p:spTree>
     <p:extLst>
       <p:ext uri="{BB962C8B-B14F-4D97-AF65-F5344CB8AC3E}">
-        <p14:creationId xmlns="" xmlns:p14="http://schemas.microsoft.com/office/powerpoint/2010/main" val="955833728"/>
+        <p14:creationId xmlns:p14="http://schemas.microsoft.com/office/powerpoint/2010/main" xmlns="" val="955833728"/>
       </p:ext>
     </p:extLst>
   </p:cSld>
@@ -564,7 +565,7 @@
     </p:spTree>
     <p:extLst>
       <p:ext uri="{BB962C8B-B14F-4D97-AF65-F5344CB8AC3E}">
-        <p14:creationId xmlns="" xmlns:p14="http://schemas.microsoft.com/office/powerpoint/2010/main" val="2168082141"/>
+        <p14:creationId xmlns:p14="http://schemas.microsoft.com/office/powerpoint/2010/main" xmlns="" val="2168082141"/>
       </p:ext>
     </p:extLst>
   </p:cSld>
@@ -756,7 +757,7 @@
             <a:fld id="{05612CAE-C21A-45A3-8E49-2F7FBBD9F92C}" type="datetimeFigureOut">
               <a:rPr lang="ru-RU" smtClean="0"/>
               <a:pPr/>
-              <a:t>21.11.2011</a:t>
+              <a:t>24.11.2011</a:t>
             </a:fld>
             <a:endParaRPr lang="ru-RU"/>
           </a:p>
@@ -808,7 +809,7 @@
     </p:spTree>
     <p:extLst>
       <p:ext uri="{BB962C8B-B14F-4D97-AF65-F5344CB8AC3E}">
-        <p14:creationId xmlns="" xmlns:p14="http://schemas.microsoft.com/office/powerpoint/2010/main" val="2617290998"/>
+        <p14:creationId xmlns:p14="http://schemas.microsoft.com/office/powerpoint/2010/main" xmlns="" val="2617290998"/>
       </p:ext>
     </p:extLst>
   </p:cSld>
@@ -928,7 +929,7 @@
             <a:fld id="{05612CAE-C21A-45A3-8E49-2F7FBBD9F92C}" type="datetimeFigureOut">
               <a:rPr lang="ru-RU" smtClean="0"/>
               <a:pPr/>
-              <a:t>21.11.2011</a:t>
+              <a:t>24.11.2011</a:t>
             </a:fld>
             <a:endParaRPr lang="ru-RU"/>
           </a:p>
@@ -980,7 +981,7 @@
     </p:spTree>
     <p:extLst>
       <p:ext uri="{BB962C8B-B14F-4D97-AF65-F5344CB8AC3E}">
-        <p14:creationId xmlns="" xmlns:p14="http://schemas.microsoft.com/office/powerpoint/2010/main" val="2935049992"/>
+        <p14:creationId xmlns:p14="http://schemas.microsoft.com/office/powerpoint/2010/main" xmlns="" val="2935049992"/>
       </p:ext>
     </p:extLst>
   </p:cSld>
@@ -1110,7 +1111,7 @@
             <a:fld id="{05612CAE-C21A-45A3-8E49-2F7FBBD9F92C}" type="datetimeFigureOut">
               <a:rPr lang="ru-RU" smtClean="0"/>
               <a:pPr/>
-              <a:t>21.11.2011</a:t>
+              <a:t>24.11.2011</a:t>
             </a:fld>
             <a:endParaRPr lang="ru-RU"/>
           </a:p>
@@ -1162,7 +1163,7 @@
     </p:spTree>
     <p:extLst>
       <p:ext uri="{BB962C8B-B14F-4D97-AF65-F5344CB8AC3E}">
-        <p14:creationId xmlns="" xmlns:p14="http://schemas.microsoft.com/office/powerpoint/2010/main" val="187541163"/>
+        <p14:creationId xmlns:p14="http://schemas.microsoft.com/office/powerpoint/2010/main" xmlns="" val="187541163"/>
       </p:ext>
     </p:extLst>
   </p:cSld>
@@ -1282,7 +1283,7 @@
             <a:fld id="{05612CAE-C21A-45A3-8E49-2F7FBBD9F92C}" type="datetimeFigureOut">
               <a:rPr lang="ru-RU" smtClean="0"/>
               <a:pPr/>
-              <a:t>21.11.2011</a:t>
+              <a:t>24.11.2011</a:t>
             </a:fld>
             <a:endParaRPr lang="ru-RU"/>
           </a:p>
@@ -1334,7 +1335,7 @@
     </p:spTree>
     <p:extLst>
       <p:ext uri="{BB962C8B-B14F-4D97-AF65-F5344CB8AC3E}">
-        <p14:creationId xmlns="" xmlns:p14="http://schemas.microsoft.com/office/powerpoint/2010/main" val="343029952"/>
+        <p14:creationId xmlns:p14="http://schemas.microsoft.com/office/powerpoint/2010/main" xmlns="" val="343029952"/>
       </p:ext>
     </p:extLst>
   </p:cSld>
@@ -1530,7 +1531,7 @@
             <a:fld id="{05612CAE-C21A-45A3-8E49-2F7FBBD9F92C}" type="datetimeFigureOut">
               <a:rPr lang="ru-RU" smtClean="0"/>
               <a:pPr/>
-              <a:t>21.11.2011</a:t>
+              <a:t>24.11.2011</a:t>
             </a:fld>
             <a:endParaRPr lang="ru-RU"/>
           </a:p>
@@ -1582,7 +1583,7 @@
     </p:spTree>
     <p:extLst>
       <p:ext uri="{BB962C8B-B14F-4D97-AF65-F5344CB8AC3E}">
-        <p14:creationId xmlns="" xmlns:p14="http://schemas.microsoft.com/office/powerpoint/2010/main" val="829998270"/>
+        <p14:creationId xmlns:p14="http://schemas.microsoft.com/office/powerpoint/2010/main" xmlns="" val="829998270"/>
       </p:ext>
     </p:extLst>
   </p:cSld>
@@ -1820,7 +1821,7 @@
             <a:fld id="{05612CAE-C21A-45A3-8E49-2F7FBBD9F92C}" type="datetimeFigureOut">
               <a:rPr lang="ru-RU" smtClean="0"/>
               <a:pPr/>
-              <a:t>21.11.2011</a:t>
+              <a:t>24.11.2011</a:t>
             </a:fld>
             <a:endParaRPr lang="ru-RU"/>
           </a:p>
@@ -1872,7 +1873,7 @@
     </p:spTree>
     <p:extLst>
       <p:ext uri="{BB962C8B-B14F-4D97-AF65-F5344CB8AC3E}">
-        <p14:creationId xmlns="" xmlns:p14="http://schemas.microsoft.com/office/powerpoint/2010/main" val="705950764"/>
+        <p14:creationId xmlns:p14="http://schemas.microsoft.com/office/powerpoint/2010/main" xmlns="" val="705950764"/>
       </p:ext>
     </p:extLst>
   </p:cSld>
@@ -2244,7 +2245,7 @@
             <a:fld id="{05612CAE-C21A-45A3-8E49-2F7FBBD9F92C}" type="datetimeFigureOut">
               <a:rPr lang="ru-RU" smtClean="0"/>
               <a:pPr/>
-              <a:t>21.11.2011</a:t>
+              <a:t>24.11.2011</a:t>
             </a:fld>
             <a:endParaRPr lang="ru-RU"/>
           </a:p>
@@ -2296,7 +2297,7 @@
     </p:spTree>
     <p:extLst>
       <p:ext uri="{BB962C8B-B14F-4D97-AF65-F5344CB8AC3E}">
-        <p14:creationId xmlns="" xmlns:p14="http://schemas.microsoft.com/office/powerpoint/2010/main" val="1047751014"/>
+        <p14:creationId xmlns:p14="http://schemas.microsoft.com/office/powerpoint/2010/main" xmlns="" val="1047751014"/>
       </p:ext>
     </p:extLst>
   </p:cSld>
@@ -2364,7 +2365,7 @@
             <a:fld id="{05612CAE-C21A-45A3-8E49-2F7FBBD9F92C}" type="datetimeFigureOut">
               <a:rPr lang="ru-RU" smtClean="0"/>
               <a:pPr/>
-              <a:t>21.11.2011</a:t>
+              <a:t>24.11.2011</a:t>
             </a:fld>
             <a:endParaRPr lang="ru-RU"/>
           </a:p>
@@ -2416,7 +2417,7 @@
     </p:spTree>
     <p:extLst>
       <p:ext uri="{BB962C8B-B14F-4D97-AF65-F5344CB8AC3E}">
-        <p14:creationId xmlns="" xmlns:p14="http://schemas.microsoft.com/office/powerpoint/2010/main" val="2252366790"/>
+        <p14:creationId xmlns:p14="http://schemas.microsoft.com/office/powerpoint/2010/main" xmlns="" val="2252366790"/>
       </p:ext>
     </p:extLst>
   </p:cSld>
@@ -2461,7 +2462,7 @@
             <a:fld id="{05612CAE-C21A-45A3-8E49-2F7FBBD9F92C}" type="datetimeFigureOut">
               <a:rPr lang="ru-RU" smtClean="0"/>
               <a:pPr/>
-              <a:t>21.11.2011</a:t>
+              <a:t>24.11.2011</a:t>
             </a:fld>
             <a:endParaRPr lang="ru-RU"/>
           </a:p>
@@ -2513,7 +2514,7 @@
     </p:spTree>
     <p:extLst>
       <p:ext uri="{BB962C8B-B14F-4D97-AF65-F5344CB8AC3E}">
-        <p14:creationId xmlns="" xmlns:p14="http://schemas.microsoft.com/office/powerpoint/2010/main" val="2112823699"/>
+        <p14:creationId xmlns:p14="http://schemas.microsoft.com/office/powerpoint/2010/main" xmlns="" val="2112823699"/>
       </p:ext>
     </p:extLst>
   </p:cSld>
@@ -2740,7 +2741,7 @@
             <a:fld id="{05612CAE-C21A-45A3-8E49-2F7FBBD9F92C}" type="datetimeFigureOut">
               <a:rPr lang="ru-RU" smtClean="0"/>
               <a:pPr/>
-              <a:t>21.11.2011</a:t>
+              <a:t>24.11.2011</a:t>
             </a:fld>
             <a:endParaRPr lang="ru-RU"/>
           </a:p>
@@ -2792,7 +2793,7 @@
     </p:spTree>
     <p:extLst>
       <p:ext uri="{BB962C8B-B14F-4D97-AF65-F5344CB8AC3E}">
-        <p14:creationId xmlns="" xmlns:p14="http://schemas.microsoft.com/office/powerpoint/2010/main" val="34550145"/>
+        <p14:creationId xmlns:p14="http://schemas.microsoft.com/office/powerpoint/2010/main" xmlns="" val="34550145"/>
       </p:ext>
     </p:extLst>
   </p:cSld>
@@ -2995,7 +2996,7 @@
             <a:fld id="{05612CAE-C21A-45A3-8E49-2F7FBBD9F92C}" type="datetimeFigureOut">
               <a:rPr lang="ru-RU" smtClean="0"/>
               <a:pPr/>
-              <a:t>21.11.2011</a:t>
+              <a:t>24.11.2011</a:t>
             </a:fld>
             <a:endParaRPr lang="ru-RU"/>
           </a:p>
@@ -3047,7 +3048,7 @@
     </p:spTree>
     <p:extLst>
       <p:ext uri="{BB962C8B-B14F-4D97-AF65-F5344CB8AC3E}">
-        <p14:creationId xmlns="" xmlns:p14="http://schemas.microsoft.com/office/powerpoint/2010/main" val="3552378497"/>
+        <p14:creationId xmlns:p14="http://schemas.microsoft.com/office/powerpoint/2010/main" xmlns="" val="3552378497"/>
       </p:ext>
     </p:extLst>
   </p:cSld>
@@ -3210,7 +3211,7 @@
             <a:fld id="{05612CAE-C21A-45A3-8E49-2F7FBBD9F92C}" type="datetimeFigureOut">
               <a:rPr lang="ru-RU" smtClean="0"/>
               <a:pPr/>
-              <a:t>21.11.2011</a:t>
+              <a:t>24.11.2011</a:t>
             </a:fld>
             <a:endParaRPr lang="ru-RU"/>
           </a:p>
@@ -3298,7 +3299,7 @@
     </p:spTree>
     <p:extLst>
       <p:ext uri="{BB962C8B-B14F-4D97-AF65-F5344CB8AC3E}">
-        <p14:creationId xmlns="" xmlns:p14="http://schemas.microsoft.com/office/powerpoint/2010/main" val="1835200998"/>
+        <p14:creationId xmlns:p14="http://schemas.microsoft.com/office/powerpoint/2010/main" xmlns="" val="1835200998"/>
       </p:ext>
     </p:extLst>
   </p:cSld>
@@ -3655,7 +3656,7 @@
     </p:spTree>
     <p:extLst>
       <p:ext uri="{BB962C8B-B14F-4D97-AF65-F5344CB8AC3E}">
-        <p14:creationId xmlns="" xmlns:p14="http://schemas.microsoft.com/office/powerpoint/2010/main" val="427503815"/>
+        <p14:creationId xmlns:p14="http://schemas.microsoft.com/office/powerpoint/2010/main" xmlns="" val="427503815"/>
       </p:ext>
     </p:extLst>
   </p:cSld>
@@ -4537,11 +4538,7 @@
           <a:p>
             <a:r>
               <a:rPr lang="en-US" dirty="0" err="1" smtClean="0"/>
-              <a:t>model.</a:t>
-            </a:r>
-            <a:r>
-              <a:rPr lang="en-US" dirty="0" err="1" smtClean="0"/>
-              <a:t>composite</a:t>
+              <a:t>model.composite</a:t>
             </a:r>
             <a:r>
               <a:rPr lang="en-US" dirty="0" smtClean="0"/>
@@ -4594,6 +4591,44 @@
               </a:rPr>
               <a:t>(</a:t>
             </a:r>
+          </a:p>
+          <a:p>
+            <a:pPr>
+              <a:buNone/>
+            </a:pPr>
+            <a:r>
+              <a:rPr lang="en-US" sz="1000" b="1" dirty="0" smtClean="0">
+                <a:latin typeface="Lucida Console" pitchFamily="49" charset="0"/>
+              </a:rPr>
+              <a:t>	(string) chain,</a:t>
+            </a:r>
+          </a:p>
+          <a:p>
+            <a:pPr>
+              <a:buNone/>
+            </a:pPr>
+            <a:r>
+              <a:rPr lang="en-US" sz="1000" b="1" dirty="0" smtClean="0">
+                <a:latin typeface="Lucida Console" pitchFamily="49" charset="0"/>
+              </a:rPr>
+              <a:t>	(function | false) callback</a:t>
+            </a:r>
+          </a:p>
+          <a:p>
+            <a:pPr>
+              <a:buNone/>
+            </a:pPr>
+            <a:r>
+              <a:rPr lang="en-US" sz="1000" b="1" dirty="0" smtClean="0">
+                <a:latin typeface="Lucida Console" pitchFamily="49" charset="0"/>
+              </a:rPr>
+              <a:t>);</a:t>
+            </a:r>
+          </a:p>
+          <a:p>
+            <a:pPr>
+              <a:buNone/>
+            </a:pPr>
             <a:endParaRPr lang="en-US" sz="1000" b="1" dirty="0" smtClean="0">
               <a:latin typeface="Lucida Console" pitchFamily="49" charset="0"/>
             </a:endParaRPr>
@@ -4603,59 +4638,6 @@
               <a:buNone/>
             </a:pPr>
             <a:r>
-              <a:rPr lang="en-US" sz="1000" b="1" dirty="0" smtClean="0">
-                <a:latin typeface="Lucida Console" pitchFamily="49" charset="0"/>
-              </a:rPr>
-              <a:t>	(string) </a:t>
-            </a:r>
-            <a:r>
-              <a:rPr lang="en-US" sz="1000" b="1" dirty="0" smtClean="0">
-                <a:latin typeface="Lucida Console" pitchFamily="49" charset="0"/>
-              </a:rPr>
-              <a:t>chain,</a:t>
-            </a:r>
-          </a:p>
-          <a:p>
-            <a:pPr>
-              <a:buNone/>
-            </a:pPr>
-            <a:r>
-              <a:rPr lang="en-US" sz="1000" b="1" dirty="0" smtClean="0">
-                <a:latin typeface="Lucida Console" pitchFamily="49" charset="0"/>
-              </a:rPr>
-              <a:t>	</a:t>
-            </a:r>
-            <a:r>
-              <a:rPr lang="en-US" sz="1000" b="1" dirty="0" smtClean="0">
-                <a:latin typeface="Lucida Console" pitchFamily="49" charset="0"/>
-              </a:rPr>
-              <a:t>(function | false) callback</a:t>
-            </a:r>
-          </a:p>
-          <a:p>
-            <a:pPr>
-              <a:buNone/>
-            </a:pPr>
-            <a:r>
-              <a:rPr lang="en-US" sz="1000" b="1" dirty="0" smtClean="0">
-                <a:latin typeface="Lucida Console" pitchFamily="49" charset="0"/>
-              </a:rPr>
-              <a:t>);</a:t>
-            </a:r>
-          </a:p>
-          <a:p>
-            <a:pPr>
-              <a:buNone/>
-            </a:pPr>
-            <a:endParaRPr lang="en-US" sz="1000" b="1" dirty="0" smtClean="0">
-              <a:latin typeface="Lucida Console" pitchFamily="49" charset="0"/>
-            </a:endParaRPr>
-          </a:p>
-          <a:p>
-            <a:pPr>
-              <a:buNone/>
-            </a:pPr>
-            <a:r>
               <a:rPr lang="ru-RU" sz="1000" dirty="0" smtClean="0">
                 <a:latin typeface="Lucida Console" pitchFamily="49" charset="0"/>
               </a:rPr>
@@ -4709,13 +4691,7 @@
               <a:rPr lang="en-US" sz="1000" dirty="0" smtClean="0">
                 <a:latin typeface="Lucida Console" pitchFamily="49" charset="0"/>
               </a:rPr>
-              <a:t>	</a:t>
-            </a:r>
-            <a:r>
-              <a:rPr lang="en-US" sz="1000" dirty="0" smtClean="0">
-                <a:latin typeface="Lucida Console" pitchFamily="49" charset="0"/>
-              </a:rPr>
-              <a:t>name: {</a:t>
+              <a:t>	name: {</a:t>
             </a:r>
           </a:p>
           <a:p>
@@ -4737,14 +4713,38 @@
               <a:rPr lang="en-US" sz="1000" dirty="0" smtClean="0">
                 <a:latin typeface="Lucida Console" pitchFamily="49" charset="0"/>
               </a:rPr>
-              <a:t>		</a:t>
-            </a:r>
-            <a:r>
-              <a:rPr lang="en-US" sz="1000" dirty="0" smtClean="0">
-                <a:latin typeface="Lucida Console" pitchFamily="49" charset="0"/>
-              </a:rPr>
-              <a:t>last: ‘Smith’</a:t>
-            </a:r>
+              <a:t>		last: ‘Smith’</a:t>
+            </a:r>
+          </a:p>
+          <a:p>
+            <a:pPr>
+              <a:buNone/>
+            </a:pPr>
+            <a:r>
+              <a:rPr lang="en-US" sz="1000" dirty="0" smtClean="0">
+                <a:latin typeface="Lucida Console" pitchFamily="49" charset="0"/>
+              </a:rPr>
+              <a:t>	}</a:t>
+            </a:r>
+          </a:p>
+          <a:p>
+            <a:pPr>
+              <a:buNone/>
+            </a:pPr>
+            <a:r>
+              <a:rPr lang="en-US" sz="1000" dirty="0" smtClean="0">
+                <a:latin typeface="Lucida Console" pitchFamily="49" charset="0"/>
+              </a:rPr>
+              <a:t>});</a:t>
+            </a:r>
+            <a:endParaRPr lang="ru-RU" sz="1000" dirty="0" smtClean="0">
+              <a:latin typeface="Lucida Console" pitchFamily="49" charset="0"/>
+            </a:endParaRPr>
+          </a:p>
+          <a:p>
+            <a:pPr>
+              <a:buNone/>
+            </a:pPr>
             <a:endParaRPr lang="en-US" sz="1000" dirty="0" smtClean="0">
               <a:latin typeface="Lucida Console" pitchFamily="49" charset="0"/>
             </a:endParaRPr>
@@ -4754,10 +4754,75 @@
               <a:buNone/>
             </a:pPr>
             <a:r>
-              <a:rPr lang="en-US" sz="1000" dirty="0" smtClean="0">
-                <a:latin typeface="Lucida Console" pitchFamily="49" charset="0"/>
-              </a:rPr>
-              <a:t>	}</a:t>
+              <a:rPr lang="en-US" sz="1000" dirty="0" err="1" smtClean="0">
+                <a:latin typeface="Lucida Console" pitchFamily="49" charset="0"/>
+              </a:rPr>
+              <a:t>model.composite</a:t>
+            </a:r>
+            <a:r>
+              <a:rPr lang="en-US" sz="1000" dirty="0" smtClean="0">
+                <a:latin typeface="Lucida Console" pitchFamily="49" charset="0"/>
+              </a:rPr>
+              <a:t>(‘</a:t>
+            </a:r>
+            <a:r>
+              <a:rPr lang="en-US" sz="1000" dirty="0" err="1" smtClean="0">
+                <a:latin typeface="Lucida Console" pitchFamily="49" charset="0"/>
+              </a:rPr>
+              <a:t>fullName</a:t>
+            </a:r>
+            <a:r>
+              <a:rPr lang="en-US" sz="1000" dirty="0" smtClean="0">
+                <a:latin typeface="Lucida Console" pitchFamily="49" charset="0"/>
+              </a:rPr>
+              <a:t>’, function( </a:t>
+            </a:r>
+            <a:r>
+              <a:rPr lang="en-US" sz="1000" dirty="0" err="1" smtClean="0">
+                <a:latin typeface="Lucida Console" pitchFamily="49" charset="0"/>
+              </a:rPr>
+              <a:t>params</a:t>
+            </a:r>
+            <a:r>
+              <a:rPr lang="en-US" sz="1000" dirty="0" smtClean="0">
+                <a:latin typeface="Lucida Console" pitchFamily="49" charset="0"/>
+              </a:rPr>
+              <a:t> ){</a:t>
+            </a:r>
+          </a:p>
+          <a:p>
+            <a:pPr>
+              <a:buNone/>
+            </a:pPr>
+            <a:r>
+              <a:rPr lang="en-US" sz="1000" dirty="0" smtClean="0">
+                <a:latin typeface="Lucida Console" pitchFamily="49" charset="0"/>
+              </a:rPr>
+              <a:t>	return this('</a:t>
+            </a:r>
+            <a:r>
+              <a:rPr lang="en-US" sz="1000" dirty="0" err="1" smtClean="0">
+                <a:latin typeface="Lucida Console" pitchFamily="49" charset="0"/>
+              </a:rPr>
+              <a:t>name.first</a:t>
+            </a:r>
+            <a:r>
+              <a:rPr lang="en-US" sz="1000" dirty="0" smtClean="0">
+                <a:latin typeface="Lucida Console" pitchFamily="49" charset="0"/>
+              </a:rPr>
+              <a:t>') +' '+ this('</a:t>
+            </a:r>
+            <a:r>
+              <a:rPr lang="en-US" sz="1000" dirty="0" err="1" smtClean="0">
+                <a:latin typeface="Lucida Console" pitchFamily="49" charset="0"/>
+              </a:rPr>
+              <a:t>name.last</a:t>
+            </a:r>
+            <a:r>
+              <a:rPr lang="en-US" sz="1000" dirty="0" smtClean="0">
+                <a:latin typeface="Lucida Console" pitchFamily="49" charset="0"/>
+              </a:rPr>
+              <a:t>');</a:t>
             </a:r>
           </a:p>
           <a:p>
@@ -4778,6 +4843,57 @@
             <a:pPr>
               <a:buNone/>
             </a:pPr>
+            <a:r>
+              <a:rPr lang="en-US" sz="1000" dirty="0" err="1" smtClean="0">
+                <a:latin typeface="Lucida Console" pitchFamily="49" charset="0"/>
+              </a:rPr>
+              <a:t>model.follow</a:t>
+            </a:r>
+            <a:r>
+              <a:rPr lang="en-US" sz="1000" dirty="0" smtClean="0">
+                <a:latin typeface="Lucida Console" pitchFamily="49" charset="0"/>
+              </a:rPr>
+              <a:t>(‘</a:t>
+            </a:r>
+            <a:r>
+              <a:rPr lang="en-US" sz="1000" dirty="0" err="1" smtClean="0">
+                <a:latin typeface="Lucida Console" pitchFamily="49" charset="0"/>
+              </a:rPr>
+              <a:t>fullName</a:t>
+            </a:r>
+            <a:r>
+              <a:rPr lang="en-US" sz="1000" dirty="0" smtClean="0">
+                <a:latin typeface="Lucida Console" pitchFamily="49" charset="0"/>
+              </a:rPr>
+              <a:t>’, function( name ){</a:t>
+            </a:r>
+          </a:p>
+          <a:p>
+            <a:pPr>
+              <a:buNone/>
+            </a:pPr>
+            <a:r>
+              <a:rPr lang="en-US" sz="1000" dirty="0" smtClean="0">
+                <a:latin typeface="Lucida Console" pitchFamily="49" charset="0"/>
+              </a:rPr>
+              <a:t>	 alert(name);</a:t>
+            </a:r>
+          </a:p>
+          <a:p>
+            <a:pPr>
+              <a:buNone/>
+            </a:pPr>
+            <a:r>
+              <a:rPr lang="en-US" sz="1000" dirty="0" smtClean="0">
+                <a:latin typeface="Lucida Console" pitchFamily="49" charset="0"/>
+              </a:rPr>
+              <a:t>});</a:t>
+            </a:r>
+          </a:p>
+          <a:p>
+            <a:pPr>
+              <a:buNone/>
+            </a:pPr>
             <a:endParaRPr lang="en-US" sz="1000" dirty="0" smtClean="0">
               <a:latin typeface="Lucida Console" pitchFamily="49" charset="0"/>
             </a:endParaRPr>
@@ -4787,9 +4903,99 @@
               <a:buNone/>
             </a:pPr>
             <a:r>
+              <a:rPr lang="en-US" sz="1000" dirty="0" smtClean="0">
+                <a:latin typeface="Lucida Console" pitchFamily="49" charset="0"/>
+              </a:rPr>
+              <a:t>// </a:t>
+            </a:r>
+            <a:r>
+              <a:rPr lang="ru-RU" sz="1000" dirty="0" smtClean="0">
+                <a:latin typeface="Lucida Console" pitchFamily="49" charset="0"/>
+              </a:rPr>
+              <a:t>при изменении зависимой цепочки в модели, автоматически обновляется значение </a:t>
+            </a:r>
+            <a:r>
               <a:rPr lang="en-US" sz="1000" dirty="0" err="1" smtClean="0">
                 <a:latin typeface="Lucida Console" pitchFamily="49" charset="0"/>
               </a:rPr>
+              <a:t>fullName</a:t>
+            </a:r>
+            <a:r>
+              <a:rPr lang="en-US" sz="1000" dirty="0" smtClean="0">
+                <a:latin typeface="Lucida Console" pitchFamily="49" charset="0"/>
+              </a:rPr>
+              <a:t> </a:t>
+            </a:r>
+            <a:r>
+              <a:rPr lang="ru-RU" sz="1000" dirty="0" smtClean="0">
+                <a:latin typeface="Lucida Console" pitchFamily="49" charset="0"/>
+              </a:rPr>
+              <a:t>и </a:t>
+            </a:r>
+            <a:r>
+              <a:rPr lang="ru-RU" sz="1000" dirty="0" err="1" smtClean="0">
+                <a:latin typeface="Lucida Console" pitchFamily="49" charset="0"/>
+              </a:rPr>
+              <a:t>тригерятся</a:t>
+            </a:r>
+            <a:r>
+              <a:rPr lang="ru-RU" sz="1000" dirty="0" smtClean="0">
+                <a:latin typeface="Lucida Console" pitchFamily="49" charset="0"/>
+              </a:rPr>
+              <a:t> все существующие </a:t>
+            </a:r>
+            <a:r>
+              <a:rPr lang="ru-RU" sz="1000" dirty="0" err="1" smtClean="0">
+                <a:latin typeface="Lucida Console" pitchFamily="49" charset="0"/>
+              </a:rPr>
+              <a:t>колбэки</a:t>
+            </a:r>
+            <a:endParaRPr lang="en-US" sz="1000" dirty="0" smtClean="0">
+              <a:latin typeface="Lucida Console" pitchFamily="49" charset="0"/>
+            </a:endParaRPr>
+          </a:p>
+          <a:p>
+            <a:pPr>
+              <a:buNone/>
+            </a:pPr>
+            <a:r>
+              <a:rPr lang="en-US" sz="1000" dirty="0" smtClean="0">
+                <a:latin typeface="Lucida Console" pitchFamily="49" charset="0"/>
+              </a:rPr>
+              <a:t>model(‘</a:t>
+            </a:r>
+            <a:r>
+              <a:rPr lang="en-US" sz="1000" dirty="0" err="1" smtClean="0">
+                <a:latin typeface="Lucida Console" pitchFamily="49" charset="0"/>
+              </a:rPr>
+              <a:t>name.first</a:t>
+            </a:r>
+            <a:r>
+              <a:rPr lang="en-US" sz="1000" dirty="0" smtClean="0">
+                <a:latin typeface="Lucida Console" pitchFamily="49" charset="0"/>
+              </a:rPr>
+              <a:t>’, ‘Alex’);</a:t>
+            </a:r>
+            <a:endParaRPr lang="ru-RU" sz="1000" dirty="0" smtClean="0">
+              <a:latin typeface="Lucida Console" pitchFamily="49" charset="0"/>
+            </a:endParaRPr>
+          </a:p>
+          <a:p>
+            <a:pPr>
+              <a:buNone/>
+            </a:pPr>
+            <a:endParaRPr lang="ru-RU" sz="1000" dirty="0" smtClean="0">
+              <a:latin typeface="Lucida Console" pitchFamily="49" charset="0"/>
+            </a:endParaRPr>
+          </a:p>
+          <a:p>
+            <a:pPr>
+              <a:buNone/>
+            </a:pPr>
+            <a:r>
+              <a:rPr lang="en-US" sz="1000" dirty="0" err="1" smtClean="0">
+                <a:latin typeface="Lucida Console" pitchFamily="49" charset="0"/>
+              </a:rPr>
               <a:t>model.composite</a:t>
             </a:r>
             <a:r>
@@ -4808,314 +5014,42 @@
               <a:rPr lang="en-US" sz="1000" dirty="0" smtClean="0">
                 <a:latin typeface="Lucida Console" pitchFamily="49" charset="0"/>
               </a:rPr>
-              <a:t>’, function( </a:t>
-            </a:r>
+              <a:t>’, false); // </a:t>
+            </a:r>
+            <a:r>
+              <a:rPr lang="ru-RU" sz="1000" dirty="0" smtClean="0">
+                <a:latin typeface="Lucida Console" pitchFamily="49" charset="0"/>
+              </a:rPr>
+              <a:t>удалить созданную зависимость для цепочки</a:t>
+            </a:r>
+          </a:p>
+          <a:p>
+            <a:pPr>
+              <a:buNone/>
+            </a:pPr>
             <a:r>
               <a:rPr lang="en-US" sz="1000" dirty="0" err="1" smtClean="0">
                 <a:latin typeface="Lucida Console" pitchFamily="49" charset="0"/>
               </a:rPr>
-              <a:t>params</a:t>
-            </a:r>
-            <a:r>
-              <a:rPr lang="en-US" sz="1000" dirty="0" smtClean="0">
-                <a:latin typeface="Lucida Console" pitchFamily="49" charset="0"/>
-              </a:rPr>
-              <a:t> ){</a:t>
-            </a:r>
-          </a:p>
-          <a:p>
-            <a:pPr>
-              <a:buNone/>
-            </a:pPr>
-            <a:r>
-              <a:rPr lang="en-US" sz="1000" dirty="0" smtClean="0">
-                <a:latin typeface="Lucida Console" pitchFamily="49" charset="0"/>
-              </a:rPr>
-              <a:t>	return this('</a:t>
+              <a:t>model.composite</a:t>
+            </a:r>
+            <a:r>
+              <a:rPr lang="en-US" sz="1000" dirty="0" smtClean="0">
+                <a:latin typeface="Lucida Console" pitchFamily="49" charset="0"/>
+              </a:rPr>
+              <a:t>(‘</a:t>
             </a:r>
             <a:r>
               <a:rPr lang="en-US" sz="1000" dirty="0" err="1" smtClean="0">
                 <a:latin typeface="Lucida Console" pitchFamily="49" charset="0"/>
               </a:rPr>
-              <a:t>name.first</a:t>
-            </a:r>
-            <a:r>
-              <a:rPr lang="en-US" sz="1000" dirty="0" smtClean="0">
-                <a:latin typeface="Lucida Console" pitchFamily="49" charset="0"/>
-              </a:rPr>
-              <a:t>') +' '+ this('</a:t>
-            </a:r>
-            <a:r>
-              <a:rPr lang="en-US" sz="1000" dirty="0" err="1" smtClean="0">
-                <a:latin typeface="Lucida Console" pitchFamily="49" charset="0"/>
-              </a:rPr>
-              <a:t>name.last</a:t>
-            </a:r>
-            <a:r>
-              <a:rPr lang="en-US" sz="1000" dirty="0" smtClean="0">
-                <a:latin typeface="Lucida Console" pitchFamily="49" charset="0"/>
-              </a:rPr>
-              <a:t>');</a:t>
-            </a:r>
-            <a:endParaRPr lang="en-US" sz="1000" dirty="0" smtClean="0">
-              <a:latin typeface="Lucida Console" pitchFamily="49" charset="0"/>
-            </a:endParaRPr>
-          </a:p>
-          <a:p>
-            <a:pPr>
-              <a:buNone/>
-            </a:pPr>
-            <a:r>
-              <a:rPr lang="en-US" sz="1000" dirty="0" smtClean="0">
-                <a:latin typeface="Lucida Console" pitchFamily="49" charset="0"/>
-              </a:rPr>
-              <a:t>}</a:t>
-            </a:r>
-            <a:r>
-              <a:rPr lang="en-US" sz="1000" dirty="0" smtClean="0">
-                <a:latin typeface="Lucida Console" pitchFamily="49" charset="0"/>
-              </a:rPr>
-              <a:t>);</a:t>
-            </a:r>
-            <a:endParaRPr lang="ru-RU" sz="1000" dirty="0" smtClean="0">
-              <a:latin typeface="Lucida Console" pitchFamily="49" charset="0"/>
-            </a:endParaRPr>
-          </a:p>
-          <a:p>
-            <a:pPr>
-              <a:buNone/>
-            </a:pPr>
-            <a:r>
-              <a:rPr lang="en-US" sz="1000" dirty="0" err="1" smtClean="0">
-                <a:latin typeface="Lucida Console" pitchFamily="49" charset="0"/>
-              </a:rPr>
-              <a:t>model.follow</a:t>
-            </a:r>
-            <a:r>
-              <a:rPr lang="en-US" sz="1000" dirty="0" smtClean="0">
-                <a:latin typeface="Lucida Console" pitchFamily="49" charset="0"/>
-              </a:rPr>
-              <a:t>(‘</a:t>
-            </a:r>
-            <a:r>
-              <a:rPr lang="en-US" sz="1000" dirty="0" err="1" smtClean="0">
-                <a:latin typeface="Lucida Console" pitchFamily="49" charset="0"/>
-              </a:rPr>
               <a:t>fullName</a:t>
             </a:r>
             <a:r>
               <a:rPr lang="en-US" sz="1000" dirty="0" smtClean="0">
                 <a:latin typeface="Lucida Console" pitchFamily="49" charset="0"/>
               </a:rPr>
-              <a:t>’, function( name ){</a:t>
-            </a:r>
-          </a:p>
-          <a:p>
-            <a:pPr>
-              <a:buNone/>
-            </a:pPr>
-            <a:r>
-              <a:rPr lang="en-US" sz="1000" dirty="0" smtClean="0">
-                <a:latin typeface="Lucida Console" pitchFamily="49" charset="0"/>
-              </a:rPr>
-              <a:t>	 alert(name</a:t>
-            </a:r>
-            <a:r>
-              <a:rPr lang="en-US" sz="1000" dirty="0" smtClean="0">
-                <a:latin typeface="Lucida Console" pitchFamily="49" charset="0"/>
-              </a:rPr>
-              <a:t>);</a:t>
-            </a:r>
-          </a:p>
-          <a:p>
-            <a:pPr>
-              <a:buNone/>
-            </a:pPr>
-            <a:r>
-              <a:rPr lang="en-US" sz="1000" dirty="0" smtClean="0">
-                <a:latin typeface="Lucida Console" pitchFamily="49" charset="0"/>
-              </a:rPr>
-              <a:t>});</a:t>
-            </a:r>
-          </a:p>
-          <a:p>
-            <a:pPr>
-              <a:buNone/>
-            </a:pPr>
-            <a:endParaRPr lang="en-US" sz="1000" dirty="0" smtClean="0">
-              <a:latin typeface="Lucida Console" pitchFamily="49" charset="0"/>
-            </a:endParaRPr>
-          </a:p>
-          <a:p>
-            <a:pPr>
-              <a:buNone/>
-            </a:pPr>
-            <a:r>
-              <a:rPr lang="en-US" sz="1000" dirty="0" smtClean="0">
-                <a:latin typeface="Lucida Console" pitchFamily="49" charset="0"/>
-              </a:rPr>
-              <a:t>// </a:t>
-            </a:r>
-            <a:r>
-              <a:rPr lang="ru-RU" sz="1000" dirty="0" smtClean="0">
-                <a:latin typeface="Lucida Console" pitchFamily="49" charset="0"/>
-              </a:rPr>
-              <a:t>при изменении зависимой цепочки в модели, автоматически обновляется значение </a:t>
-            </a:r>
-            <a:r>
-              <a:rPr lang="en-US" sz="1000" dirty="0" err="1" smtClean="0">
-                <a:latin typeface="Lucida Console" pitchFamily="49" charset="0"/>
-              </a:rPr>
-              <a:t>fullName</a:t>
-            </a:r>
-            <a:r>
-              <a:rPr lang="en-US" sz="1000" dirty="0" smtClean="0">
-                <a:latin typeface="Lucida Console" pitchFamily="49" charset="0"/>
-              </a:rPr>
-              <a:t> </a:t>
-            </a:r>
-            <a:r>
-              <a:rPr lang="ru-RU" sz="1000" dirty="0" smtClean="0">
-                <a:latin typeface="Lucida Console" pitchFamily="49" charset="0"/>
-              </a:rPr>
-              <a:t>и </a:t>
-            </a:r>
-            <a:r>
-              <a:rPr lang="ru-RU" sz="1000" dirty="0" err="1" smtClean="0">
-                <a:latin typeface="Lucida Console" pitchFamily="49" charset="0"/>
-              </a:rPr>
-              <a:t>тригерятся</a:t>
-            </a:r>
-            <a:r>
-              <a:rPr lang="ru-RU" sz="1000" dirty="0" smtClean="0">
-                <a:latin typeface="Lucida Console" pitchFamily="49" charset="0"/>
-              </a:rPr>
-              <a:t> все существующие </a:t>
-            </a:r>
-            <a:r>
-              <a:rPr lang="ru-RU" sz="1000" dirty="0" err="1" smtClean="0">
-                <a:latin typeface="Lucida Console" pitchFamily="49" charset="0"/>
-              </a:rPr>
-              <a:t>колбэки</a:t>
-            </a:r>
-            <a:endParaRPr lang="en-US" sz="1000" dirty="0" smtClean="0">
-              <a:latin typeface="Lucida Console" pitchFamily="49" charset="0"/>
-            </a:endParaRPr>
-          </a:p>
-          <a:p>
-            <a:pPr>
-              <a:buNone/>
-            </a:pPr>
-            <a:r>
-              <a:rPr lang="en-US" sz="1000" dirty="0" smtClean="0">
-                <a:latin typeface="Lucida Console" pitchFamily="49" charset="0"/>
-              </a:rPr>
-              <a:t>model(‘</a:t>
-            </a:r>
-            <a:r>
-              <a:rPr lang="en-US" sz="1000" dirty="0" err="1" smtClean="0">
-                <a:latin typeface="Lucida Console" pitchFamily="49" charset="0"/>
-              </a:rPr>
-              <a:t>name.first</a:t>
-            </a:r>
-            <a:r>
-              <a:rPr lang="en-US" sz="1000" dirty="0" smtClean="0">
-                <a:latin typeface="Lucida Console" pitchFamily="49" charset="0"/>
-              </a:rPr>
-              <a:t>’, ‘Alex’);</a:t>
-            </a:r>
-            <a:endParaRPr lang="ru-RU" sz="1000" dirty="0" smtClean="0">
-              <a:latin typeface="Lucida Console" pitchFamily="49" charset="0"/>
-            </a:endParaRPr>
-          </a:p>
-          <a:p>
-            <a:pPr>
-              <a:buNone/>
-            </a:pPr>
-            <a:endParaRPr lang="ru-RU" sz="1000" dirty="0" smtClean="0">
-              <a:latin typeface="Lucida Console" pitchFamily="49" charset="0"/>
-            </a:endParaRPr>
-          </a:p>
-          <a:p>
-            <a:pPr>
-              <a:buNone/>
-            </a:pPr>
-            <a:r>
-              <a:rPr lang="en-US" sz="1000" dirty="0" err="1" smtClean="0">
-                <a:latin typeface="Lucida Console" pitchFamily="49" charset="0"/>
-              </a:rPr>
-              <a:t>model.composite</a:t>
-            </a:r>
-            <a:r>
-              <a:rPr lang="en-US" sz="1000" dirty="0" smtClean="0">
-                <a:latin typeface="Lucida Console" pitchFamily="49" charset="0"/>
-              </a:rPr>
-              <a:t>(‘</a:t>
-            </a:r>
-            <a:r>
-              <a:rPr lang="en-US" sz="1000" dirty="0" err="1" smtClean="0">
-                <a:latin typeface="Lucida Console" pitchFamily="49" charset="0"/>
-              </a:rPr>
-              <a:t>fullName</a:t>
-            </a:r>
-            <a:r>
-              <a:rPr lang="en-US" sz="1000" dirty="0" smtClean="0">
-                <a:latin typeface="Lucida Console" pitchFamily="49" charset="0"/>
-              </a:rPr>
-              <a:t>’, false</a:t>
-            </a:r>
-            <a:r>
-              <a:rPr lang="en-US" sz="1000" dirty="0" smtClean="0">
-                <a:latin typeface="Lucida Console" pitchFamily="49" charset="0"/>
-              </a:rPr>
-              <a:t>); </a:t>
-            </a:r>
-            <a:r>
-              <a:rPr lang="en-US" sz="1000" dirty="0" smtClean="0">
-                <a:latin typeface="Lucida Console" pitchFamily="49" charset="0"/>
-              </a:rPr>
-              <a:t>// </a:t>
-            </a:r>
-            <a:r>
-              <a:rPr lang="ru-RU" sz="1000" dirty="0" smtClean="0">
-                <a:latin typeface="Lucida Console" pitchFamily="49" charset="0"/>
-              </a:rPr>
-              <a:t>удалить созданную зависимость для цепочки</a:t>
-            </a:r>
-          </a:p>
-          <a:p>
-            <a:pPr>
-              <a:buNone/>
-            </a:pPr>
-            <a:r>
-              <a:rPr lang="en-US" sz="1000" dirty="0" err="1" smtClean="0">
-                <a:latin typeface="Lucida Console" pitchFamily="49" charset="0"/>
-              </a:rPr>
-              <a:t>model.composite</a:t>
-            </a:r>
-            <a:r>
-              <a:rPr lang="en-US" sz="1000" dirty="0" smtClean="0">
-                <a:latin typeface="Lucida Console" pitchFamily="49" charset="0"/>
-              </a:rPr>
-              <a:t>(‘</a:t>
-            </a:r>
-            <a:r>
-              <a:rPr lang="en-US" sz="1000" dirty="0" err="1" smtClean="0">
-                <a:latin typeface="Lucida Console" pitchFamily="49" charset="0"/>
-              </a:rPr>
-              <a:t>fullName</a:t>
-            </a:r>
-            <a:r>
-              <a:rPr lang="en-US" sz="1000" dirty="0" smtClean="0">
-                <a:latin typeface="Lucida Console" pitchFamily="49" charset="0"/>
-              </a:rPr>
-              <a:t>’); </a:t>
-            </a:r>
-            <a:r>
-              <a:rPr lang="en-US" sz="1000" dirty="0" smtClean="0">
-                <a:latin typeface="Lucida Console" pitchFamily="49" charset="0"/>
-              </a:rPr>
-              <a:t>// </a:t>
+              <a:t>’); // </a:t>
             </a:r>
             <a:r>
               <a:rPr lang="ru-RU" sz="1000" dirty="0" smtClean="0">
@@ -5249,29 +5183,31 @@
               <a:rPr lang="en-US" sz="1000" b="1" dirty="0" smtClean="0">
                 <a:latin typeface="Lucida Console" pitchFamily="49" charset="0"/>
               </a:rPr>
-              <a:t>model</a:t>
+              <a:t>model </a:t>
+            </a:r>
+            <a:r>
+              <a:rPr lang="en-US" sz="1000" b="1" dirty="0" err="1" smtClean="0">
+                <a:latin typeface="Lucida Console" pitchFamily="49" charset="0"/>
+              </a:rPr>
+              <a:t>model.dispatch</a:t>
             </a:r>
             <a:r>
               <a:rPr lang="en-US" sz="1000" b="1" dirty="0" smtClean="0">
                 <a:latin typeface="Lucida Console" pitchFamily="49" charset="0"/>
               </a:rPr>
-              <a:t> </a:t>
-            </a:r>
-            <a:r>
-              <a:rPr lang="en-US" sz="1000" b="1" dirty="0" err="1" smtClean="0">
-                <a:latin typeface="Lucida Console" pitchFamily="49" charset="0"/>
-              </a:rPr>
-              <a:t>model.dispatch</a:t>
-            </a:r>
+              <a:t>(</a:t>
+            </a:r>
+          </a:p>
+          <a:p>
+            <a:pPr>
+              <a:buNone/>
+            </a:pPr>
             <a:r>
               <a:rPr lang="en-US" sz="1000" b="1" dirty="0" smtClean="0">
                 <a:latin typeface="Lucida Console" pitchFamily="49" charset="0"/>
               </a:rPr>
-              <a:t>(</a:t>
-            </a:r>
-            <a:endParaRPr lang="en-US" sz="1000" b="1" dirty="0" smtClean="0">
-              <a:latin typeface="Lucida Console" pitchFamily="49" charset="0"/>
-            </a:endParaRPr>
+              <a:t>	(string) chain,</a:t>
+            </a:r>
           </a:p>
           <a:p>
             <a:pPr>
@@ -5281,13 +5217,18 @@
               <a:rPr lang="en-US" sz="1000" b="1" dirty="0" smtClean="0">
                 <a:latin typeface="Lucida Console" pitchFamily="49" charset="0"/>
               </a:rPr>
-              <a:t>	(string) </a:t>
-            </a:r>
+              <a:t>	(array) [data],</a:t>
+            </a:r>
+          </a:p>
+          <a:p>
+            <a:pPr>
+              <a:buNone/>
+            </a:pPr>
             <a:r>
               <a:rPr lang="en-US" sz="1000" b="1" dirty="0" smtClean="0">
                 <a:latin typeface="Lucida Console" pitchFamily="49" charset="0"/>
               </a:rPr>
-              <a:t>chain,</a:t>
+              <a:t>	(function | number) [filter]</a:t>
             </a:r>
           </a:p>
           <a:p>
@@ -5298,58 +5239,6 @@
               <a:rPr lang="en-US" sz="1000" b="1" dirty="0" smtClean="0">
                 <a:latin typeface="Lucida Console" pitchFamily="49" charset="0"/>
               </a:rPr>
-              <a:t>	</a:t>
-            </a:r>
-            <a:r>
-              <a:rPr lang="en-US" sz="1000" b="1" dirty="0" smtClean="0">
-                <a:latin typeface="Lucida Console" pitchFamily="49" charset="0"/>
-              </a:rPr>
-              <a:t>(</a:t>
-            </a:r>
-            <a:r>
-              <a:rPr lang="en-US" sz="1000" b="1" dirty="0" smtClean="0">
-                <a:latin typeface="Lucida Console" pitchFamily="49" charset="0"/>
-              </a:rPr>
-              <a:t>array</a:t>
-            </a:r>
-            <a:r>
-              <a:rPr lang="en-US" sz="1000" b="1" dirty="0" smtClean="0">
-                <a:latin typeface="Lucida Console" pitchFamily="49" charset="0"/>
-              </a:rPr>
-              <a:t>) [data],</a:t>
-            </a:r>
-            <a:endParaRPr lang="en-US" sz="1000" b="1" dirty="0" smtClean="0">
-              <a:latin typeface="Lucida Console" pitchFamily="49" charset="0"/>
-            </a:endParaRPr>
-          </a:p>
-          <a:p>
-            <a:pPr>
-              <a:buNone/>
-            </a:pPr>
-            <a:r>
-              <a:rPr lang="en-US" sz="1000" b="1" dirty="0" smtClean="0">
-                <a:latin typeface="Lucida Console" pitchFamily="49" charset="0"/>
-              </a:rPr>
-              <a:t>	</a:t>
-            </a:r>
-            <a:r>
-              <a:rPr lang="en-US" sz="1000" b="1" dirty="0" smtClean="0">
-                <a:latin typeface="Lucida Console" pitchFamily="49" charset="0"/>
-              </a:rPr>
-              <a:t>(function | number) [filter]</a:t>
-            </a:r>
-            <a:endParaRPr lang="en-US" sz="1000" b="1" dirty="0" smtClean="0">
-              <a:latin typeface="Lucida Console" pitchFamily="49" charset="0"/>
-            </a:endParaRPr>
-          </a:p>
-          <a:p>
-            <a:pPr>
-              <a:buNone/>
-            </a:pPr>
-            <a:r>
-              <a:rPr lang="en-US" sz="1000" b="1" dirty="0" smtClean="0">
-                <a:latin typeface="Lucida Console" pitchFamily="49" charset="0"/>
-              </a:rPr>
               <a:t>);</a:t>
             </a:r>
             <a:endParaRPr lang="ru-RU" sz="1000" b="1" dirty="0" smtClean="0">
@@ -5420,19 +5309,7 @@
               <a:rPr lang="en-US" sz="1000" dirty="0" smtClean="0">
                 <a:latin typeface="Lucida Console" pitchFamily="49" charset="0"/>
               </a:rPr>
-              <a:t>[</a:t>
-            </a:r>
-            <a:r>
-              <a:rPr lang="en-US" sz="1000" dirty="0" smtClean="0">
-                <a:latin typeface="Lucida Console" pitchFamily="49" charset="0"/>
-              </a:rPr>
-              <a:t>value</a:t>
-            </a:r>
-            <a:r>
-              <a:rPr lang="en-US" sz="1000" dirty="0" smtClean="0">
-                <a:latin typeface="Lucida Console" pitchFamily="49" charset="0"/>
-              </a:rPr>
-              <a:t>, {</a:t>
+              <a:t>[value, {</a:t>
             </a:r>
             <a:r>
               <a:rPr lang="en-US" sz="1000" dirty="0" err="1" smtClean="0">
@@ -5455,25 +5332,47 @@
               <a:rPr lang="ru-RU" sz="1000" dirty="0" smtClean="0">
                 <a:latin typeface="Lucida Console" pitchFamily="49" charset="0"/>
               </a:rPr>
-              <a:t>Третий аргумент фильтр принимает </a:t>
+              <a:t>Третий аргумент фильтр принимает ссылку на </a:t>
+            </a:r>
+            <a:r>
+              <a:rPr lang="ru-RU" sz="1000" dirty="0" err="1" smtClean="0">
+                <a:latin typeface="Lucida Console" pitchFamily="49" charset="0"/>
+              </a:rPr>
+              <a:t>коллбэк</a:t>
             </a:r>
             <a:r>
               <a:rPr lang="ru-RU" sz="1000" dirty="0" smtClean="0">
                 <a:latin typeface="Lucida Console" pitchFamily="49" charset="0"/>
               </a:rPr>
-              <a:t>ссылку на </a:t>
-            </a:r>
-            <a:r>
-              <a:rPr lang="ru-RU" sz="1000" dirty="0" err="1" smtClean="0">
-                <a:latin typeface="Lucida Console" pitchFamily="49" charset="0"/>
-              </a:rPr>
-              <a:t>коллбэк</a:t>
+              <a:t> или его номер (начиная с 0)</a:t>
+            </a:r>
+            <a:endParaRPr lang="en-US" sz="1000" dirty="0" smtClean="0">
+              <a:latin typeface="Lucida Console" pitchFamily="49" charset="0"/>
+            </a:endParaRPr>
+          </a:p>
+          <a:p>
+            <a:pPr>
+              <a:buNone/>
+            </a:pPr>
+            <a:endParaRPr lang="ru-RU" sz="1000" b="1" dirty="0" smtClean="0">
+              <a:latin typeface="Lucida Console" pitchFamily="49" charset="0"/>
+            </a:endParaRPr>
+          </a:p>
+          <a:p>
+            <a:pPr>
+              <a:buNone/>
+            </a:pPr>
+            <a:r>
+              <a:rPr lang="en-US" sz="1000" dirty="0" smtClean="0">
+                <a:latin typeface="Lucida Console" pitchFamily="49" charset="0"/>
+              </a:rPr>
+              <a:t>// </a:t>
             </a:r>
             <a:r>
               <a:rPr lang="ru-RU" sz="1000" dirty="0" smtClean="0">
                 <a:latin typeface="Lucida Console" pitchFamily="49" charset="0"/>
               </a:rPr>
-              <a:t> или его номер (начиная с 0)</a:t>
+              <a:t>пример</a:t>
             </a:r>
             <a:endParaRPr lang="en-US" sz="1000" dirty="0" smtClean="0">
               <a:latin typeface="Lucida Console" pitchFamily="49" charset="0"/>
@@ -5483,34 +5382,6 @@
             <a:pPr>
               <a:buNone/>
             </a:pPr>
-            <a:endParaRPr lang="ru-RU" sz="1000" b="1" dirty="0" smtClean="0">
-              <a:latin typeface="Lucida Console" pitchFamily="49" charset="0"/>
-            </a:endParaRPr>
-          </a:p>
-          <a:p>
-            <a:pPr>
-              <a:buNone/>
-            </a:pPr>
-            <a:r>
-              <a:rPr lang="en-US" sz="1000" dirty="0" smtClean="0">
-                <a:latin typeface="Lucida Console" pitchFamily="49" charset="0"/>
-              </a:rPr>
-              <a:t>// </a:t>
-            </a:r>
-            <a:r>
-              <a:rPr lang="ru-RU" sz="1000" dirty="0" smtClean="0">
-                <a:latin typeface="Lucida Console" pitchFamily="49" charset="0"/>
-              </a:rPr>
-              <a:t>пример</a:t>
-            </a:r>
-            <a:endParaRPr lang="en-US" sz="1000" dirty="0" smtClean="0">
-              <a:latin typeface="Lucida Console" pitchFamily="49" charset="0"/>
-            </a:endParaRPr>
-          </a:p>
-          <a:p>
-            <a:pPr>
-              <a:buNone/>
-            </a:pPr>
             <a:r>
               <a:rPr lang="en-US" sz="1000" dirty="0" smtClean="0">
                 <a:latin typeface="Lucida Console" pitchFamily="49" charset="0"/>
@@ -5555,13 +5426,7 @@
               <a:rPr lang="en-US" sz="1000" dirty="0" smtClean="0">
                 <a:latin typeface="Lucida Console" pitchFamily="49" charset="0"/>
               </a:rPr>
-              <a:t>	</a:t>
-            </a:r>
-            <a:r>
-              <a:rPr lang="en-US" sz="1000" dirty="0" smtClean="0">
-                <a:latin typeface="Lucida Console" pitchFamily="49" charset="0"/>
-              </a:rPr>
-              <a:t>alert(</a:t>
+              <a:t>	alert(</a:t>
             </a:r>
             <a:r>
               <a:rPr lang="en-US" sz="1000" dirty="0" err="1" smtClean="0">
@@ -5710,11 +5575,7 @@
           <a:p>
             <a:r>
               <a:rPr lang="en-US" dirty="0" err="1" smtClean="0"/>
-              <a:t>model.</a:t>
-            </a:r>
-            <a:r>
-              <a:rPr lang="en-US" dirty="0" err="1" smtClean="0"/>
-              <a:t>merge</a:t>
+              <a:t>model.merge</a:t>
             </a:r>
             <a:r>
               <a:rPr lang="en-US" dirty="0" smtClean="0"/>
@@ -5753,171 +5614,318 @@
               <a:rPr lang="en-US" sz="1000" b="1" dirty="0" smtClean="0">
                 <a:latin typeface="Lucida Console" pitchFamily="49" charset="0"/>
               </a:rPr>
-              <a:t>model</a:t>
+              <a:t>model </a:t>
+            </a:r>
+            <a:r>
+              <a:rPr lang="en-US" sz="1000" b="1" dirty="0" err="1" smtClean="0">
+                <a:latin typeface="Lucida Console" pitchFamily="49" charset="0"/>
+              </a:rPr>
+              <a:t>model.merge</a:t>
             </a:r>
             <a:r>
               <a:rPr lang="en-US" sz="1000" b="1" dirty="0" smtClean="0">
                 <a:latin typeface="Lucida Console" pitchFamily="49" charset="0"/>
               </a:rPr>
-              <a:t> </a:t>
-            </a:r>
-            <a:r>
-              <a:rPr lang="en-US" sz="1000" b="1" dirty="0" err="1" smtClean="0">
+              <a:t>(</a:t>
+            </a:r>
+          </a:p>
+          <a:p>
+            <a:pPr>
+              <a:buNone/>
+            </a:pPr>
+            <a:r>
+              <a:rPr lang="en-US" sz="1000" b="1" dirty="0" smtClean="0">
+                <a:latin typeface="Lucida Console" pitchFamily="49" charset="0"/>
+              </a:rPr>
+              <a:t>	(object) data</a:t>
+            </a:r>
+          </a:p>
+          <a:p>
+            <a:pPr>
+              <a:buNone/>
+            </a:pPr>
+            <a:r>
+              <a:rPr lang="en-US" sz="1000" b="1" dirty="0" smtClean="0">
+                <a:latin typeface="Lucida Console" pitchFamily="49" charset="0"/>
+              </a:rPr>
+              <a:t>);</a:t>
+            </a:r>
+            <a:endParaRPr lang="ru-RU" sz="1000" b="1" dirty="0" smtClean="0">
+              <a:latin typeface="Lucida Console" pitchFamily="49" charset="0"/>
+            </a:endParaRPr>
+          </a:p>
+          <a:p>
+            <a:pPr>
+              <a:buNone/>
+            </a:pPr>
+            <a:endParaRPr lang="ru-RU" sz="1000" b="1" dirty="0" smtClean="0">
+              <a:latin typeface="Lucida Console" pitchFamily="49" charset="0"/>
+            </a:endParaRPr>
+          </a:p>
+          <a:p>
+            <a:pPr>
+              <a:buNone/>
+            </a:pPr>
+            <a:r>
+              <a:rPr lang="ru-RU" sz="1000" dirty="0" smtClean="0">
+                <a:latin typeface="Lucida Console" pitchFamily="49" charset="0"/>
+              </a:rPr>
+              <a:t>Слияние (обновление) модели с новой структурой данных.</a:t>
+            </a:r>
+          </a:p>
+          <a:p>
+            <a:pPr>
+              <a:buNone/>
+            </a:pPr>
+            <a:endParaRPr lang="ru-RU" sz="1000" dirty="0" smtClean="0">
+              <a:latin typeface="Lucida Console" pitchFamily="49" charset="0"/>
+            </a:endParaRPr>
+          </a:p>
+          <a:p>
+            <a:pPr>
+              <a:buNone/>
+            </a:pPr>
+            <a:r>
+              <a:rPr lang="en-US" sz="1000" dirty="0" smtClean="0">
+                <a:latin typeface="Lucida Console" pitchFamily="49" charset="0"/>
+              </a:rPr>
+              <a:t>// </a:t>
+            </a:r>
+            <a:r>
+              <a:rPr lang="ru-RU" sz="1000" dirty="0" smtClean="0">
+                <a:latin typeface="Lucida Console" pitchFamily="49" charset="0"/>
+              </a:rPr>
+              <a:t>пример</a:t>
+            </a:r>
+          </a:p>
+          <a:p>
+            <a:pPr>
+              <a:buNone/>
+            </a:pPr>
+            <a:r>
+              <a:rPr lang="en-US" sz="1000" dirty="0" smtClean="0">
+                <a:latin typeface="Lucida Console" pitchFamily="49" charset="0"/>
+              </a:rPr>
+              <a:t>model({</a:t>
+            </a:r>
+          </a:p>
+          <a:p>
+            <a:pPr>
+              <a:buNone/>
+            </a:pPr>
+            <a:r>
+              <a:rPr lang="en-US" sz="1000" dirty="0" smtClean="0">
+                <a:latin typeface="Lucida Console" pitchFamily="49" charset="0"/>
+              </a:rPr>
+              <a:t>	colors: [‘red’, ‘green’],</a:t>
+            </a:r>
+          </a:p>
+          <a:p>
+            <a:pPr>
+              <a:buNone/>
+            </a:pPr>
+            <a:r>
+              <a:rPr lang="en-US" sz="1000" dirty="0" smtClean="0">
+                <a:latin typeface="Lucida Console" pitchFamily="49" charset="0"/>
+              </a:rPr>
+              <a:t>	</a:t>
+            </a:r>
+            <a:r>
+              <a:rPr lang="en-US" sz="1000" dirty="0" err="1" smtClean="0">
+                <a:latin typeface="Lucida Console" pitchFamily="49" charset="0"/>
+              </a:rPr>
+              <a:t>lang</a:t>
+            </a:r>
+            <a:r>
+              <a:rPr lang="en-US" sz="1000" dirty="0" smtClean="0">
+                <a:latin typeface="Lucida Console" pitchFamily="49" charset="0"/>
+              </a:rPr>
+              <a:t>: {</a:t>
+            </a:r>
+          </a:p>
+          <a:p>
+            <a:pPr>
+              <a:buNone/>
+            </a:pPr>
+            <a:r>
+              <a:rPr lang="en-US" sz="1000" dirty="0" smtClean="0">
+                <a:latin typeface="Lucida Console" pitchFamily="49" charset="0"/>
+              </a:rPr>
+              <a:t>		from: ‘en’,</a:t>
+            </a:r>
+          </a:p>
+          <a:p>
+            <a:pPr>
+              <a:buNone/>
+            </a:pPr>
+            <a:r>
+              <a:rPr lang="en-US" sz="1000" dirty="0" smtClean="0">
+                <a:latin typeface="Lucida Console" pitchFamily="49" charset="0"/>
+              </a:rPr>
+              <a:t>		to: ‘</a:t>
+            </a:r>
+            <a:r>
+              <a:rPr lang="en-US" sz="1000" dirty="0" err="1" smtClean="0">
+                <a:latin typeface="Lucida Console" pitchFamily="49" charset="0"/>
+              </a:rPr>
+              <a:t>es’</a:t>
+            </a:r>
+            <a:endParaRPr lang="en-US" sz="1000" dirty="0" smtClean="0">
+              <a:latin typeface="Lucida Console" pitchFamily="49" charset="0"/>
+            </a:endParaRPr>
+          </a:p>
+          <a:p>
+            <a:pPr>
+              <a:buNone/>
+            </a:pPr>
+            <a:r>
+              <a:rPr lang="en-US" sz="1000" dirty="0" smtClean="0">
+                <a:latin typeface="Lucida Console" pitchFamily="49" charset="0"/>
+              </a:rPr>
+              <a:t>	}</a:t>
+            </a:r>
+          </a:p>
+          <a:p>
+            <a:pPr>
+              <a:buNone/>
+            </a:pPr>
+            <a:r>
+              <a:rPr lang="en-US" sz="1000" dirty="0" smtClean="0">
+                <a:latin typeface="Lucida Console" pitchFamily="49" charset="0"/>
+              </a:rPr>
+              <a:t>});</a:t>
+            </a:r>
+          </a:p>
+          <a:p>
+            <a:pPr>
+              <a:buNone/>
+            </a:pPr>
+            <a:endParaRPr lang="en-US" sz="1000" dirty="0" smtClean="0">
+              <a:latin typeface="Lucida Console" pitchFamily="49" charset="0"/>
+            </a:endParaRPr>
+          </a:p>
+          <a:p>
+            <a:pPr>
+              <a:buNone/>
+            </a:pPr>
+            <a:r>
+              <a:rPr lang="en-US" sz="1000" dirty="0" err="1" smtClean="0">
+                <a:latin typeface="Lucida Console" pitchFamily="49" charset="0"/>
+              </a:rPr>
+              <a:t>model.follow</a:t>
+            </a:r>
+            <a:r>
+              <a:rPr lang="en-US" sz="1000" dirty="0" smtClean="0">
+                <a:latin typeface="Lucida Console" pitchFamily="49" charset="0"/>
+              </a:rPr>
+              <a:t>(/</a:t>
+            </a:r>
+            <a:r>
+              <a:rPr lang="en-US" sz="1000" dirty="0" err="1" smtClean="0">
+                <a:latin typeface="Lucida Console" pitchFamily="49" charset="0"/>
+              </a:rPr>
+              <a:t>lang</a:t>
+            </a:r>
+            <a:r>
+              <a:rPr lang="en-US" sz="1000" dirty="0" smtClean="0">
+                <a:latin typeface="Lucida Console" pitchFamily="49" charset="0"/>
+              </a:rPr>
+              <a:t>(\..+)*/, function( value, </a:t>
+            </a:r>
+            <a:r>
+              <a:rPr lang="en-US" sz="1000" dirty="0" err="1" smtClean="0">
+                <a:latin typeface="Lucida Console" pitchFamily="49" charset="0"/>
+              </a:rPr>
+              <a:t>params</a:t>
+            </a:r>
+            <a:r>
+              <a:rPr lang="en-US" sz="1000" dirty="0" smtClean="0">
+                <a:latin typeface="Lucida Console" pitchFamily="49" charset="0"/>
+              </a:rPr>
+              <a:t> ){</a:t>
+            </a:r>
+          </a:p>
+          <a:p>
+            <a:pPr>
+              <a:buNone/>
+            </a:pPr>
+            <a:r>
+              <a:rPr lang="en-US" sz="1000" dirty="0" smtClean="0">
+                <a:latin typeface="Lucida Console" pitchFamily="49" charset="0"/>
+              </a:rPr>
+              <a:t>	alert( </a:t>
+            </a:r>
+            <a:r>
+              <a:rPr lang="en-US" sz="1000" dirty="0" err="1" smtClean="0">
+                <a:latin typeface="Lucida Console" pitchFamily="49" charset="0"/>
+              </a:rPr>
+              <a:t>params.chain</a:t>
+            </a:r>
+            <a:r>
+              <a:rPr lang="en-US" sz="1000" dirty="0" smtClean="0">
+                <a:latin typeface="Lucida Console" pitchFamily="49" charset="0"/>
+              </a:rPr>
+              <a:t> );</a:t>
+            </a:r>
+          </a:p>
+          <a:p>
+            <a:pPr>
+              <a:buNone/>
+            </a:pPr>
+            <a:r>
+              <a:rPr lang="en-US" sz="1000" dirty="0" smtClean="0">
+                <a:latin typeface="Lucida Console" pitchFamily="49" charset="0"/>
+              </a:rPr>
+              <a:t>});</a:t>
+            </a:r>
+          </a:p>
+          <a:p>
+            <a:pPr>
+              <a:buNone/>
+            </a:pPr>
+            <a:endParaRPr lang="en-US" sz="1000" dirty="0" smtClean="0">
+              <a:latin typeface="Lucida Console" pitchFamily="49" charset="0"/>
+            </a:endParaRPr>
+          </a:p>
+          <a:p>
+            <a:pPr>
+              <a:buNone/>
+            </a:pPr>
+            <a:r>
+              <a:rPr lang="en-US" sz="1000" dirty="0" err="1" smtClean="0">
                 <a:latin typeface="Lucida Console" pitchFamily="49" charset="0"/>
               </a:rPr>
               <a:t>model.merge</a:t>
             </a:r>
             <a:r>
-              <a:rPr lang="en-US" sz="1000" b="1" dirty="0" smtClean="0">
-                <a:latin typeface="Lucida Console" pitchFamily="49" charset="0"/>
-              </a:rPr>
-              <a:t>(</a:t>
-            </a:r>
-            <a:endParaRPr lang="en-US" sz="1000" b="1" dirty="0" smtClean="0">
-              <a:latin typeface="Lucida Console" pitchFamily="49" charset="0"/>
-            </a:endParaRPr>
-          </a:p>
-          <a:p>
-            <a:pPr>
-              <a:buNone/>
-            </a:pPr>
-            <a:r>
-              <a:rPr lang="en-US" sz="1000" b="1" dirty="0" smtClean="0">
+              <a:rPr lang="en-US" sz="1000" dirty="0" smtClean="0">
+                <a:latin typeface="Lucida Console" pitchFamily="49" charset="0"/>
+              </a:rPr>
+              <a:t>({</a:t>
+            </a:r>
+          </a:p>
+          <a:p>
+            <a:pPr>
+              <a:buNone/>
+            </a:pPr>
+            <a:r>
+              <a:rPr lang="en-US" sz="1000" dirty="0" smtClean="0">
+                <a:latin typeface="Lucida Console" pitchFamily="49" charset="0"/>
+              </a:rPr>
+              <a:t>	colors: [‘blue’, ‘red’, ‘white’],</a:t>
+            </a:r>
+          </a:p>
+          <a:p>
+            <a:pPr>
+              <a:buNone/>
+            </a:pPr>
+            <a:r>
+              <a:rPr lang="en-US" sz="1000" dirty="0" smtClean="0">
                 <a:latin typeface="Lucida Console" pitchFamily="49" charset="0"/>
               </a:rPr>
               <a:t>	</a:t>
             </a:r>
             <a:r>
-              <a:rPr lang="en-US" sz="1000" b="1" dirty="0" smtClean="0">
-                <a:latin typeface="Lucida Console" pitchFamily="49" charset="0"/>
-              </a:rPr>
-              <a:t>(object) </a:t>
-            </a:r>
-            <a:r>
-              <a:rPr lang="en-US" sz="1000" b="1" dirty="0" smtClean="0">
-                <a:latin typeface="Lucida Console" pitchFamily="49" charset="0"/>
-              </a:rPr>
-              <a:t>data</a:t>
-            </a:r>
-            <a:endParaRPr lang="en-US" sz="1000" b="1" dirty="0" smtClean="0">
-              <a:latin typeface="Lucida Console" pitchFamily="49" charset="0"/>
-            </a:endParaRPr>
-          </a:p>
-          <a:p>
-            <a:pPr>
-              <a:buNone/>
-            </a:pPr>
-            <a:r>
-              <a:rPr lang="en-US" sz="1000" b="1" dirty="0" smtClean="0">
-                <a:latin typeface="Lucida Console" pitchFamily="49" charset="0"/>
-              </a:rPr>
-              <a:t>);</a:t>
-            </a:r>
-            <a:endParaRPr lang="ru-RU" sz="1000" b="1" dirty="0" smtClean="0">
-              <a:latin typeface="Lucida Console" pitchFamily="49" charset="0"/>
-            </a:endParaRPr>
-          </a:p>
-          <a:p>
-            <a:pPr>
-              <a:buNone/>
-            </a:pPr>
-            <a:endParaRPr lang="ru-RU" sz="1000" b="1" dirty="0" smtClean="0">
-              <a:latin typeface="Lucida Console" pitchFamily="49" charset="0"/>
-            </a:endParaRPr>
-          </a:p>
-          <a:p>
-            <a:pPr>
-              <a:buNone/>
-            </a:pPr>
-            <a:r>
-              <a:rPr lang="ru-RU" sz="1000" dirty="0" smtClean="0">
-                <a:latin typeface="Lucida Console" pitchFamily="49" charset="0"/>
-              </a:rPr>
-              <a:t>Слияние (обновление) модели с новой структурой данных.</a:t>
-            </a:r>
-          </a:p>
-          <a:p>
-            <a:pPr>
-              <a:buNone/>
-            </a:pPr>
-            <a:endParaRPr lang="ru-RU" sz="1000" dirty="0" smtClean="0">
-              <a:latin typeface="Lucida Console" pitchFamily="49" charset="0"/>
-            </a:endParaRPr>
-          </a:p>
-          <a:p>
-            <a:pPr>
-              <a:buNone/>
-            </a:pPr>
-            <a:r>
-              <a:rPr lang="en-US" sz="1000" dirty="0" smtClean="0">
-                <a:latin typeface="Lucida Console" pitchFamily="49" charset="0"/>
-              </a:rPr>
-              <a:t>// </a:t>
-            </a:r>
-            <a:r>
-              <a:rPr lang="ru-RU" sz="1000" dirty="0" smtClean="0">
-                <a:latin typeface="Lucida Console" pitchFamily="49" charset="0"/>
-              </a:rPr>
-              <a:t>пример</a:t>
-            </a:r>
-          </a:p>
-          <a:p>
-            <a:pPr>
-              <a:buNone/>
-            </a:pPr>
-            <a:r>
-              <a:rPr lang="en-US" sz="1000" dirty="0" smtClean="0">
-                <a:latin typeface="Lucida Console" pitchFamily="49" charset="0"/>
-              </a:rPr>
-              <a:t>model({</a:t>
-            </a:r>
-          </a:p>
-          <a:p>
-            <a:pPr>
-              <a:buNone/>
-            </a:pPr>
-            <a:r>
-              <a:rPr lang="en-US" sz="1000" dirty="0" smtClean="0">
-                <a:latin typeface="Lucida Console" pitchFamily="49" charset="0"/>
-              </a:rPr>
-              <a:t>	colors</a:t>
-            </a:r>
-            <a:r>
-              <a:rPr lang="en-US" sz="1000" dirty="0" smtClean="0">
-                <a:latin typeface="Lucida Console" pitchFamily="49" charset="0"/>
-              </a:rPr>
-              <a:t>: </a:t>
-            </a:r>
-            <a:r>
-              <a:rPr lang="en-US" sz="1000" dirty="0" smtClean="0">
-                <a:latin typeface="Lucida Console" pitchFamily="49" charset="0"/>
-              </a:rPr>
-              <a:t>[‘red’, </a:t>
-            </a:r>
-            <a:r>
-              <a:rPr lang="en-US" sz="1000" dirty="0" smtClean="0">
-                <a:latin typeface="Lucida Console" pitchFamily="49" charset="0"/>
-              </a:rPr>
-              <a:t>‘green</a:t>
-            </a:r>
-            <a:r>
-              <a:rPr lang="en-US" sz="1000" dirty="0" smtClean="0">
-                <a:latin typeface="Lucida Console" pitchFamily="49" charset="0"/>
-              </a:rPr>
-              <a:t>’],</a:t>
-            </a:r>
-          </a:p>
-          <a:p>
-            <a:pPr>
-              <a:buNone/>
-            </a:pPr>
-            <a:r>
-              <a:rPr lang="en-US" sz="1000" dirty="0" smtClean="0">
-                <a:latin typeface="Lucida Console" pitchFamily="49" charset="0"/>
-              </a:rPr>
-              <a:t>	</a:t>
-            </a:r>
-            <a:r>
               <a:rPr lang="en-US" sz="1000" dirty="0" err="1" smtClean="0">
                 <a:latin typeface="Lucida Console" pitchFamily="49" charset="0"/>
               </a:rPr>
@@ -5938,34 +5946,20 @@
               <a:rPr lang="en-US" sz="1000" dirty="0" smtClean="0">
                 <a:latin typeface="Lucida Console" pitchFamily="49" charset="0"/>
               </a:rPr>
-              <a:t>		from: ‘en’,</a:t>
-            </a:r>
-          </a:p>
-          <a:p>
-            <a:pPr>
-              <a:buNone/>
-            </a:pPr>
-            <a:r>
-              <a:rPr lang="en-US" sz="1000" dirty="0" smtClean="0">
-                <a:latin typeface="Lucida Console" pitchFamily="49" charset="0"/>
-              </a:rPr>
-              <a:t>		</a:t>
-            </a:r>
-            <a:r>
-              <a:rPr lang="en-US" sz="1000" dirty="0" smtClean="0">
-                <a:latin typeface="Lucida Console" pitchFamily="49" charset="0"/>
-              </a:rPr>
-              <a:t>to: ‘</a:t>
+              <a:t>		local: ‘</a:t>
             </a:r>
             <a:r>
               <a:rPr lang="en-US" sz="1000" dirty="0" err="1" smtClean="0">
                 <a:latin typeface="Lucida Console" pitchFamily="49" charset="0"/>
               </a:rPr>
-              <a:t>es’</a:t>
-            </a:r>
-            <a:endParaRPr lang="en-US" sz="1000" dirty="0" smtClean="0">
-              <a:latin typeface="Lucida Console" pitchFamily="49" charset="0"/>
-            </a:endParaRPr>
+              <a:t>ru</a:t>
+            </a:r>
+            <a:r>
+              <a:rPr lang="en-US" sz="1000" dirty="0" smtClean="0">
+                <a:latin typeface="Lucida Console" pitchFamily="49" charset="0"/>
+              </a:rPr>
+              <a:t>’</a:t>
+            </a:r>
           </a:p>
           <a:p>
             <a:pPr>
@@ -5987,229 +5981,6 @@
                 <a:latin typeface="Lucida Console" pitchFamily="49" charset="0"/>
               </a:rPr>
               <a:t>});</a:t>
-            </a:r>
-          </a:p>
-          <a:p>
-            <a:pPr>
-              <a:buNone/>
-            </a:pPr>
-            <a:endParaRPr lang="en-US" sz="1000" dirty="0" smtClean="0">
-              <a:latin typeface="Lucida Console" pitchFamily="49" charset="0"/>
-            </a:endParaRPr>
-          </a:p>
-          <a:p>
-            <a:pPr>
-              <a:buNone/>
-            </a:pPr>
-            <a:r>
-              <a:rPr lang="en-US" sz="1000" dirty="0" err="1" smtClean="0">
-                <a:latin typeface="Lucida Console" pitchFamily="49" charset="0"/>
-              </a:rPr>
-              <a:t>model.follow</a:t>
-            </a:r>
-            <a:r>
-              <a:rPr lang="en-US" sz="1000" dirty="0" smtClean="0">
-                <a:latin typeface="Lucida Console" pitchFamily="49" charset="0"/>
-              </a:rPr>
-              <a:t>(/</a:t>
-            </a:r>
-            <a:r>
-              <a:rPr lang="en-US" sz="1000" dirty="0" err="1" smtClean="0">
-                <a:latin typeface="Lucida Console" pitchFamily="49" charset="0"/>
-              </a:rPr>
-              <a:t>lang</a:t>
-            </a:r>
-            <a:r>
-              <a:rPr lang="en-US" sz="1000" dirty="0" smtClean="0">
-                <a:latin typeface="Lucida Console" pitchFamily="49" charset="0"/>
-              </a:rPr>
-              <a:t>(\..+)*/, function( value, </a:t>
-            </a:r>
-            <a:r>
-              <a:rPr lang="en-US" sz="1000" dirty="0" err="1" smtClean="0">
-                <a:latin typeface="Lucida Console" pitchFamily="49" charset="0"/>
-              </a:rPr>
-              <a:t>params</a:t>
-            </a:r>
-            <a:r>
-              <a:rPr lang="en-US" sz="1000" dirty="0" smtClean="0">
-                <a:latin typeface="Lucida Console" pitchFamily="49" charset="0"/>
-              </a:rPr>
-              <a:t> ){</a:t>
-            </a:r>
-          </a:p>
-          <a:p>
-            <a:pPr>
-              <a:buNone/>
-            </a:pPr>
-            <a:r>
-              <a:rPr lang="en-US" sz="1000" dirty="0" smtClean="0">
-                <a:latin typeface="Lucida Console" pitchFamily="49" charset="0"/>
-              </a:rPr>
-              <a:t>	</a:t>
-            </a:r>
-            <a:r>
-              <a:rPr lang="en-US" sz="1000" dirty="0" smtClean="0">
-                <a:latin typeface="Lucida Console" pitchFamily="49" charset="0"/>
-              </a:rPr>
-              <a:t>alert( </a:t>
-            </a:r>
-            <a:r>
-              <a:rPr lang="en-US" sz="1000" dirty="0" err="1" smtClean="0">
-                <a:latin typeface="Lucida Console" pitchFamily="49" charset="0"/>
-              </a:rPr>
-              <a:t>params.chain</a:t>
-            </a:r>
-            <a:r>
-              <a:rPr lang="en-US" sz="1000" dirty="0" smtClean="0">
-                <a:latin typeface="Lucida Console" pitchFamily="49" charset="0"/>
-              </a:rPr>
-              <a:t> </a:t>
-            </a:r>
-            <a:r>
-              <a:rPr lang="en-US" sz="1000" dirty="0" smtClean="0">
-                <a:latin typeface="Lucida Console" pitchFamily="49" charset="0"/>
-              </a:rPr>
-              <a:t>);</a:t>
-            </a:r>
-          </a:p>
-          <a:p>
-            <a:pPr>
-              <a:buNone/>
-            </a:pPr>
-            <a:r>
-              <a:rPr lang="en-US" sz="1000" dirty="0" smtClean="0">
-                <a:latin typeface="Lucida Console" pitchFamily="49" charset="0"/>
-              </a:rPr>
-              <a:t>});</a:t>
-            </a:r>
-          </a:p>
-          <a:p>
-            <a:pPr>
-              <a:buNone/>
-            </a:pPr>
-            <a:endParaRPr lang="en-US" sz="1000" dirty="0" smtClean="0">
-              <a:latin typeface="Lucida Console" pitchFamily="49" charset="0"/>
-            </a:endParaRPr>
-          </a:p>
-          <a:p>
-            <a:pPr>
-              <a:buNone/>
-            </a:pPr>
-            <a:r>
-              <a:rPr lang="en-US" sz="1000" dirty="0" err="1" smtClean="0">
-                <a:latin typeface="Lucida Console" pitchFamily="49" charset="0"/>
-              </a:rPr>
-              <a:t>model.merge</a:t>
-            </a:r>
-            <a:r>
-              <a:rPr lang="en-US" sz="1000" dirty="0" smtClean="0">
-                <a:latin typeface="Lucida Console" pitchFamily="49" charset="0"/>
-              </a:rPr>
-              <a:t>({</a:t>
-            </a:r>
-          </a:p>
-          <a:p>
-            <a:pPr>
-              <a:buNone/>
-            </a:pPr>
-            <a:r>
-              <a:rPr lang="en-US" sz="1000" dirty="0" smtClean="0">
-                <a:latin typeface="Lucida Console" pitchFamily="49" charset="0"/>
-              </a:rPr>
-              <a:t>	</a:t>
-            </a:r>
-            <a:r>
-              <a:rPr lang="en-US" sz="1000" dirty="0" smtClean="0">
-                <a:latin typeface="Lucida Console" pitchFamily="49" charset="0"/>
-              </a:rPr>
-              <a:t>colors: [‘blue’, ‘red’, ‘white’],</a:t>
-            </a:r>
-          </a:p>
-          <a:p>
-            <a:pPr>
-              <a:buNone/>
-            </a:pPr>
-            <a:r>
-              <a:rPr lang="en-US" sz="1000" dirty="0" smtClean="0">
-                <a:latin typeface="Lucida Console" pitchFamily="49" charset="0"/>
-              </a:rPr>
-              <a:t>	</a:t>
-            </a:r>
-            <a:r>
-              <a:rPr lang="en-US" sz="1000" dirty="0" err="1" smtClean="0">
-                <a:latin typeface="Lucida Console" pitchFamily="49" charset="0"/>
-              </a:rPr>
-              <a:t>lang</a:t>
-            </a:r>
-            <a:r>
-              <a:rPr lang="en-US" sz="1000" dirty="0" smtClean="0">
-                <a:latin typeface="Lucida Console" pitchFamily="49" charset="0"/>
-              </a:rPr>
-              <a:t>: {</a:t>
-            </a:r>
-          </a:p>
-          <a:p>
-            <a:pPr>
-              <a:buNone/>
-            </a:pPr>
-            <a:r>
-              <a:rPr lang="en-US" sz="1000" dirty="0" smtClean="0">
-                <a:latin typeface="Lucida Console" pitchFamily="49" charset="0"/>
-              </a:rPr>
-              <a:t>	</a:t>
-            </a:r>
-            <a:r>
-              <a:rPr lang="en-US" sz="1000" dirty="0" smtClean="0">
-                <a:latin typeface="Lucida Console" pitchFamily="49" charset="0"/>
-              </a:rPr>
-              <a:t>	local: ‘</a:t>
-            </a:r>
-            <a:r>
-              <a:rPr lang="en-US" sz="1000" dirty="0" err="1" smtClean="0">
-                <a:latin typeface="Lucida Console" pitchFamily="49" charset="0"/>
-              </a:rPr>
-              <a:t>ru</a:t>
-            </a:r>
-            <a:r>
-              <a:rPr lang="en-US" sz="1000" dirty="0" smtClean="0">
-                <a:latin typeface="Lucida Console" pitchFamily="49" charset="0"/>
-              </a:rPr>
-              <a:t>’</a:t>
-            </a:r>
-          </a:p>
-          <a:p>
-            <a:pPr>
-              <a:buNone/>
-            </a:pPr>
-            <a:r>
-              <a:rPr lang="en-US" sz="1000" dirty="0" smtClean="0">
-                <a:latin typeface="Lucida Console" pitchFamily="49" charset="0"/>
-              </a:rPr>
-              <a:t>	</a:t>
-            </a:r>
-            <a:r>
-              <a:rPr lang="en-US" sz="1000" dirty="0" smtClean="0">
-                <a:latin typeface="Lucida Console" pitchFamily="49" charset="0"/>
-              </a:rPr>
-              <a:t>}</a:t>
-            </a:r>
-          </a:p>
-          <a:p>
-            <a:pPr>
-              <a:buNone/>
-            </a:pPr>
-            <a:r>
-              <a:rPr lang="en-US" sz="1000" dirty="0" smtClean="0">
-                <a:latin typeface="Lucida Console" pitchFamily="49" charset="0"/>
-              </a:rPr>
-              <a:t>}</a:t>
-            </a:r>
-            <a:r>
-              <a:rPr lang="en-US" sz="1000" dirty="0" smtClean="0">
-                <a:latin typeface="Lucida Console" pitchFamily="49" charset="0"/>
-              </a:rPr>
-              <a:t>);</a:t>
             </a:r>
           </a:p>
         </p:txBody>
@@ -6223,6 +5994,562 @@
 </file>
 
 <file path=ppt/slides/slide15.xml><?xml version="1.0" encoding="utf-8"?>
+<p:sld xmlns:a="http://schemas.openxmlformats.org/drawingml/2006/main" xmlns:r="http://schemas.openxmlformats.org/officeDocument/2006/relationships" xmlns:p="http://schemas.openxmlformats.org/presentationml/2006/main">
+  <p:cSld>
+    <p:spTree>
+      <p:nvGrpSpPr>
+        <p:cNvPr id="1" name=""/>
+        <p:cNvGrpSpPr/>
+        <p:nvPr/>
+      </p:nvGrpSpPr>
+      <p:grpSpPr>
+        <a:xfrm>
+          <a:off x="0" y="0"/>
+          <a:ext cx="0" cy="0"/>
+          <a:chOff x="0" y="0"/>
+          <a:chExt cx="0" cy="0"/>
+        </a:xfrm>
+      </p:grpSpPr>
+      <p:sp>
+        <p:nvSpPr>
+          <p:cNvPr id="2" name="Заголовок 1"/>
+          <p:cNvSpPr>
+            <a:spLocks noGrp="1"/>
+          </p:cNvSpPr>
+          <p:nvPr>
+            <p:ph type="title"/>
+          </p:nvPr>
+        </p:nvSpPr>
+        <p:spPr/>
+        <p:style>
+          <a:lnRef idx="1">
+            <a:schemeClr val="accent1"/>
+          </a:lnRef>
+          <a:fillRef idx="2">
+            <a:schemeClr val="accent1"/>
+          </a:fillRef>
+          <a:effectRef idx="1">
+            <a:schemeClr val="accent1"/>
+          </a:effectRef>
+          <a:fontRef idx="minor">
+            <a:schemeClr val="dk1"/>
+          </a:fontRef>
+        </p:style>
+        <p:txBody>
+          <a:bodyPr/>
+          <a:lstStyle/>
+          <a:p>
+            <a:r>
+              <a:rPr lang="en-US" dirty="0" smtClean="0"/>
+              <a:t>model.map()</a:t>
+            </a:r>
+            <a:endParaRPr lang="ru-RU" dirty="0"/>
+          </a:p>
+        </p:txBody>
+      </p:sp>
+      <p:sp>
+        <p:nvSpPr>
+          <p:cNvPr id="3" name="Содержимое 2"/>
+          <p:cNvSpPr>
+            <a:spLocks noGrp="1"/>
+          </p:cNvSpPr>
+          <p:nvPr>
+            <p:ph idx="1"/>
+          </p:nvPr>
+        </p:nvSpPr>
+        <p:spPr>
+          <a:xfrm>
+            <a:off x="457200" y="1600200"/>
+            <a:ext cx="8229600" cy="4997152"/>
+          </a:xfrm>
+        </p:spPr>
+        <p:txBody>
+          <a:bodyPr>
+            <a:normAutofit/>
+          </a:bodyPr>
+          <a:lstStyle/>
+          <a:p>
+            <a:pPr>
+              <a:buNone/>
+            </a:pPr>
+            <a:r>
+              <a:rPr lang="en-US" sz="1000" b="1" dirty="0" smtClean="0">
+                <a:latin typeface="Lucida Console" pitchFamily="49" charset="0"/>
+              </a:rPr>
+              <a:t>mixed model.map(</a:t>
+            </a:r>
+            <a:endParaRPr lang="en-US" sz="1000" b="1" dirty="0" smtClean="0">
+              <a:latin typeface="Lucida Console" pitchFamily="49" charset="0"/>
+            </a:endParaRPr>
+          </a:p>
+          <a:p>
+            <a:pPr>
+              <a:buNone/>
+            </a:pPr>
+            <a:r>
+              <a:rPr lang="en-US" sz="1000" b="1" dirty="0" smtClean="0">
+                <a:latin typeface="Lucida Console" pitchFamily="49" charset="0"/>
+              </a:rPr>
+              <a:t>	(string) chain,</a:t>
+            </a:r>
+          </a:p>
+          <a:p>
+            <a:pPr>
+              <a:buNone/>
+            </a:pPr>
+            <a:r>
+              <a:rPr lang="en-US" sz="1000" b="1" dirty="0" smtClean="0">
+                <a:latin typeface="Lucida Console" pitchFamily="49" charset="0"/>
+              </a:rPr>
+              <a:t>	(string) </a:t>
+            </a:r>
+            <a:r>
+              <a:rPr lang="en-US" sz="1000" b="1" dirty="0" smtClean="0">
+                <a:latin typeface="Lucida Console" pitchFamily="49" charset="0"/>
+              </a:rPr>
+              <a:t>expression,</a:t>
+            </a:r>
+            <a:endParaRPr lang="en-US" sz="1000" b="1" dirty="0" smtClean="0">
+              <a:latin typeface="Lucida Console" pitchFamily="49" charset="0"/>
+            </a:endParaRPr>
+          </a:p>
+          <a:p>
+            <a:pPr>
+              <a:buNone/>
+            </a:pPr>
+            <a:r>
+              <a:rPr lang="en-US" sz="1000" b="1" dirty="0" smtClean="0">
+                <a:latin typeface="Lucida Console" pitchFamily="49" charset="0"/>
+              </a:rPr>
+              <a:t>	(string) </a:t>
+            </a:r>
+            <a:r>
+              <a:rPr lang="en-US" sz="1000" b="1" dirty="0" err="1" smtClean="0">
+                <a:latin typeface="Lucida Console" pitchFamily="49" charset="0"/>
+              </a:rPr>
+              <a:t>returnValue</a:t>
+            </a:r>
+            <a:endParaRPr lang="en-US" sz="1000" b="1" dirty="0" smtClean="0">
+              <a:latin typeface="Lucida Console" pitchFamily="49" charset="0"/>
+            </a:endParaRPr>
+          </a:p>
+          <a:p>
+            <a:pPr>
+              <a:buNone/>
+            </a:pPr>
+            <a:r>
+              <a:rPr lang="en-US" sz="1000" b="1" dirty="0" smtClean="0">
+                <a:latin typeface="Lucida Console" pitchFamily="49" charset="0"/>
+              </a:rPr>
+              <a:t>);</a:t>
+            </a:r>
+            <a:endParaRPr lang="ru-RU" sz="1000" b="1" dirty="0" smtClean="0">
+              <a:latin typeface="Lucida Console" pitchFamily="49" charset="0"/>
+            </a:endParaRPr>
+          </a:p>
+          <a:p>
+            <a:pPr>
+              <a:buNone/>
+            </a:pPr>
+            <a:endParaRPr lang="en-US" sz="1000" b="1" dirty="0" smtClean="0">
+              <a:latin typeface="Lucida Console" pitchFamily="49" charset="0"/>
+            </a:endParaRPr>
+          </a:p>
+          <a:p>
+            <a:pPr>
+              <a:buNone/>
+            </a:pPr>
+            <a:r>
+              <a:rPr lang="ru-RU" sz="1000" dirty="0" err="1" smtClean="0">
+                <a:latin typeface="Lucida Console" pitchFamily="49" charset="0"/>
+              </a:rPr>
+              <a:t>Маппер</a:t>
+            </a:r>
+            <a:r>
+              <a:rPr lang="ru-RU" sz="1000" dirty="0" smtClean="0">
+                <a:latin typeface="Lucida Console" pitchFamily="49" charset="0"/>
+              </a:rPr>
+              <a:t> для выборки данных из коллекции (массива).</a:t>
+            </a:r>
+          </a:p>
+          <a:p>
+            <a:pPr>
+              <a:buNone/>
+            </a:pPr>
+            <a:endParaRPr lang="ru-RU" sz="1000" dirty="0" smtClean="0">
+              <a:latin typeface="Lucida Console" pitchFamily="49" charset="0"/>
+            </a:endParaRPr>
+          </a:p>
+          <a:p>
+            <a:pPr>
+              <a:buNone/>
+            </a:pPr>
+            <a:r>
+              <a:rPr lang="en-US" sz="1000" dirty="0" smtClean="0">
+                <a:latin typeface="Lucida Console" pitchFamily="49" charset="0"/>
+              </a:rPr>
+              <a:t>// </a:t>
+            </a:r>
+            <a:r>
+              <a:rPr lang="ru-RU" sz="1000" dirty="0" smtClean="0">
+                <a:latin typeface="Lucida Console" pitchFamily="49" charset="0"/>
+              </a:rPr>
+              <a:t>Пример</a:t>
+            </a:r>
+          </a:p>
+          <a:p>
+            <a:pPr>
+              <a:buNone/>
+            </a:pPr>
+            <a:r>
+              <a:rPr lang="en-US" sz="1000" dirty="0" smtClean="0">
+                <a:latin typeface="Lucida Console" pitchFamily="49" charset="0"/>
+              </a:rPr>
+              <a:t>model</a:t>
+            </a:r>
+            <a:r>
+              <a:rPr lang="en-US" sz="1000" dirty="0" smtClean="0">
+                <a:latin typeface="Lucida Console" pitchFamily="49" charset="0"/>
+              </a:rPr>
+              <a:t>('collection', </a:t>
+            </a:r>
+            <a:r>
+              <a:rPr lang="en-US" sz="1000" dirty="0" smtClean="0">
+                <a:latin typeface="Lucida Console" pitchFamily="49" charset="0"/>
+              </a:rPr>
+              <a:t>[</a:t>
+            </a:r>
+            <a:endParaRPr lang="ru-RU" sz="1000" dirty="0" smtClean="0">
+              <a:latin typeface="Lucida Console" pitchFamily="49" charset="0"/>
+            </a:endParaRPr>
+          </a:p>
+          <a:p>
+            <a:pPr>
+              <a:buNone/>
+            </a:pPr>
+            <a:r>
+              <a:rPr lang="en-US" sz="1000" dirty="0" smtClean="0">
+                <a:latin typeface="Lucida Console" pitchFamily="49" charset="0"/>
+              </a:rPr>
+              <a:t>	{x: 1, y: 1, color: 'blue', b: true</a:t>
+            </a:r>
+            <a:r>
+              <a:rPr lang="en-US" sz="1000" dirty="0" smtClean="0">
+                <a:latin typeface="Lucida Console" pitchFamily="49" charset="0"/>
+              </a:rPr>
+              <a:t>},</a:t>
+            </a:r>
+            <a:endParaRPr lang="ru-RU" sz="1000" dirty="0" smtClean="0">
+              <a:latin typeface="Lucida Console" pitchFamily="49" charset="0"/>
+            </a:endParaRPr>
+          </a:p>
+          <a:p>
+            <a:pPr>
+              <a:buNone/>
+            </a:pPr>
+            <a:r>
+              <a:rPr lang="en-US" sz="1000" dirty="0" smtClean="0">
+                <a:latin typeface="Lucida Console" pitchFamily="49" charset="0"/>
+              </a:rPr>
+              <a:t>	{x: 0, y: 2, color: 'red', b: "true", test: [1,0,2</a:t>
+            </a:r>
+            <a:r>
+              <a:rPr lang="en-US" sz="1000" dirty="0" smtClean="0">
+                <a:latin typeface="Lucida Console" pitchFamily="49" charset="0"/>
+              </a:rPr>
+              <a:t>]},</a:t>
+            </a:r>
+            <a:endParaRPr lang="ru-RU" sz="1000" dirty="0" smtClean="0">
+              <a:latin typeface="Lucida Console" pitchFamily="49" charset="0"/>
+            </a:endParaRPr>
+          </a:p>
+          <a:p>
+            <a:pPr>
+              <a:buNone/>
+            </a:pPr>
+            <a:r>
+              <a:rPr lang="en-US" sz="1000" dirty="0" smtClean="0">
+                <a:latin typeface="Lucida Console" pitchFamily="49" charset="0"/>
+              </a:rPr>
+              <a:t>	{x: 1, y: 3, color: 'red</a:t>
+            </a:r>
+            <a:r>
+              <a:rPr lang="en-US" sz="1000" dirty="0" smtClean="0">
+                <a:latin typeface="Lucida Console" pitchFamily="49" charset="0"/>
+              </a:rPr>
+              <a:t>'},</a:t>
+            </a:r>
+            <a:endParaRPr lang="ru-RU" sz="1000" dirty="0" smtClean="0">
+              <a:latin typeface="Lucida Console" pitchFamily="49" charset="0"/>
+            </a:endParaRPr>
+          </a:p>
+          <a:p>
+            <a:pPr>
+              <a:buNone/>
+            </a:pPr>
+            <a:r>
+              <a:rPr lang="en-US" sz="1000" dirty="0" smtClean="0">
+                <a:latin typeface="Lucida Console" pitchFamily="49" charset="0"/>
+              </a:rPr>
+              <a:t>	{x: 0, y: 4, values: [0,1</a:t>
+            </a:r>
+            <a:r>
+              <a:rPr lang="en-US" sz="1000" dirty="0" smtClean="0">
+                <a:latin typeface="Lucida Console" pitchFamily="49" charset="0"/>
+              </a:rPr>
+              <a:t>]},</a:t>
+            </a:r>
+            <a:endParaRPr lang="ru-RU" sz="1000" dirty="0" smtClean="0">
+              <a:latin typeface="Lucida Console" pitchFamily="49" charset="0"/>
+            </a:endParaRPr>
+          </a:p>
+          <a:p>
+            <a:pPr>
+              <a:buNone/>
+            </a:pPr>
+            <a:r>
+              <a:rPr lang="en-US" sz="1000" dirty="0" smtClean="0">
+                <a:latin typeface="Lucida Console" pitchFamily="49" charset="0"/>
+              </a:rPr>
+              <a:t>	{z: 1, y: 5, children: {count: 3, list: ['one', 'two', 'three']}, x: null </a:t>
+            </a:r>
+            <a:r>
+              <a:rPr lang="en-US" sz="1000" dirty="0" smtClean="0">
+                <a:latin typeface="Lucida Console" pitchFamily="49" charset="0"/>
+              </a:rPr>
+              <a:t>}</a:t>
+            </a:r>
+            <a:endParaRPr lang="ru-RU" sz="1000" dirty="0" smtClean="0">
+              <a:latin typeface="Lucida Console" pitchFamily="49" charset="0"/>
+            </a:endParaRPr>
+          </a:p>
+          <a:p>
+            <a:pPr>
+              <a:buNone/>
+            </a:pPr>
+            <a:r>
+              <a:rPr lang="en-US" sz="1000" dirty="0" smtClean="0">
+                <a:latin typeface="Lucida Console" pitchFamily="49" charset="0"/>
+              </a:rPr>
+              <a:t>]);</a:t>
+            </a:r>
+            <a:endParaRPr lang="ru-RU" sz="1000" dirty="0" smtClean="0">
+              <a:latin typeface="Lucida Console" pitchFamily="49" charset="0"/>
+            </a:endParaRPr>
+          </a:p>
+          <a:p>
+            <a:pPr>
+              <a:buNone/>
+            </a:pPr>
+            <a:endParaRPr lang="ru-RU" sz="1000" dirty="0" smtClean="0">
+              <a:latin typeface="Lucida Console" pitchFamily="49" charset="0"/>
+            </a:endParaRPr>
+          </a:p>
+          <a:p>
+            <a:pPr>
+              <a:buNone/>
+            </a:pPr>
+            <a:r>
+              <a:rPr lang="en-US" sz="1000" dirty="0" smtClean="0">
+                <a:latin typeface="Lucida Console" pitchFamily="49" charset="0"/>
+              </a:rPr>
+              <a:t>alert</a:t>
+            </a:r>
+            <a:r>
+              <a:rPr lang="en-US" sz="1000" dirty="0" smtClean="0">
+                <a:latin typeface="Lucida Console" pitchFamily="49" charset="0"/>
+              </a:rPr>
+              <a:t>([</a:t>
+            </a:r>
+            <a:endParaRPr lang="ru-RU" sz="1000" dirty="0" smtClean="0">
+              <a:latin typeface="Lucida Console" pitchFamily="49" charset="0"/>
+            </a:endParaRPr>
+          </a:p>
+          <a:p>
+            <a:pPr>
+              <a:buNone/>
+            </a:pPr>
+            <a:r>
+              <a:rPr lang="en-US" sz="1000" dirty="0" smtClean="0">
+                <a:latin typeface="Lucida Console" pitchFamily="49" charset="0"/>
+              </a:rPr>
+              <a:t>	model.map('collection', "x[=y] || z"),	</a:t>
+            </a:r>
+            <a:r>
+              <a:rPr lang="ru-RU" sz="1000" dirty="0" smtClean="0">
+                <a:latin typeface="Lucida Console" pitchFamily="49" charset="0"/>
+              </a:rPr>
+              <a:t>	</a:t>
+            </a:r>
+            <a:r>
+              <a:rPr lang="en-US" sz="1000" dirty="0" smtClean="0">
+                <a:latin typeface="Lucida Console" pitchFamily="49" charset="0"/>
+              </a:rPr>
+              <a:t>// </a:t>
+            </a:r>
+            <a:r>
+              <a:rPr lang="en-US" sz="1000" dirty="0" smtClean="0">
+                <a:latin typeface="Lucida Console" pitchFamily="49" charset="0"/>
+              </a:rPr>
+              <a:t>[object </a:t>
+            </a:r>
+            <a:r>
+              <a:rPr lang="en-US" sz="1000" dirty="0" err="1" smtClean="0">
+                <a:latin typeface="Lucida Console" pitchFamily="49" charset="0"/>
+              </a:rPr>
+              <a:t>Object</a:t>
+            </a:r>
+            <a:r>
+              <a:rPr lang="en-US" sz="1000" dirty="0" smtClean="0">
+                <a:latin typeface="Lucida Console" pitchFamily="49" charset="0"/>
+              </a:rPr>
+              <a:t>],[object </a:t>
+            </a:r>
+            <a:r>
+              <a:rPr lang="en-US" sz="1000" dirty="0" err="1" smtClean="0">
+                <a:latin typeface="Lucida Console" pitchFamily="49" charset="0"/>
+              </a:rPr>
+              <a:t>Object</a:t>
+            </a:r>
+            <a:r>
+              <a:rPr lang="en-US" sz="1000" dirty="0" smtClean="0">
+                <a:latin typeface="Lucida Console" pitchFamily="49" charset="0"/>
+              </a:rPr>
+              <a:t>]</a:t>
+            </a:r>
+            <a:endParaRPr lang="ru-RU" sz="1000" dirty="0" smtClean="0">
+              <a:latin typeface="Lucida Console" pitchFamily="49" charset="0"/>
+            </a:endParaRPr>
+          </a:p>
+          <a:p>
+            <a:pPr>
+              <a:buNone/>
+            </a:pPr>
+            <a:r>
+              <a:rPr lang="en-US" sz="1000" dirty="0" smtClean="0">
+                <a:latin typeface="Lucida Console" pitchFamily="49" charset="0"/>
+              </a:rPr>
+              <a:t>	model.map('collection', "x[=values.0]"),		</a:t>
+            </a:r>
+            <a:r>
+              <a:rPr lang="en-US" sz="1000" dirty="0" smtClean="0">
+                <a:latin typeface="Lucida Console" pitchFamily="49" charset="0"/>
+              </a:rPr>
+              <a:t>// </a:t>
+            </a:r>
+            <a:r>
+              <a:rPr lang="en-US" sz="1000" dirty="0" smtClean="0">
+                <a:latin typeface="Lucida Console" pitchFamily="49" charset="0"/>
+              </a:rPr>
+              <a:t>[object </a:t>
+            </a:r>
+            <a:r>
+              <a:rPr lang="en-US" sz="1000" dirty="0" err="1" smtClean="0">
+                <a:latin typeface="Lucida Console" pitchFamily="49" charset="0"/>
+              </a:rPr>
+              <a:t>Object</a:t>
+            </a:r>
+            <a:r>
+              <a:rPr lang="en-US" sz="1000" dirty="0" smtClean="0">
+                <a:latin typeface="Lucida Console" pitchFamily="49" charset="0"/>
+              </a:rPr>
+              <a:t>]</a:t>
+            </a:r>
+            <a:endParaRPr lang="ru-RU" sz="1000" dirty="0" smtClean="0">
+              <a:latin typeface="Lucida Console" pitchFamily="49" charset="0"/>
+            </a:endParaRPr>
+          </a:p>
+          <a:p>
+            <a:pPr>
+              <a:buNone/>
+            </a:pPr>
+            <a:r>
+              <a:rPr lang="en-US" sz="1000" dirty="0" smtClean="0">
+                <a:latin typeface="Lucida Console" pitchFamily="49" charset="0"/>
+              </a:rPr>
+              <a:t>	model.map('collection', "y[&gt;=3] &amp;&amp; children", 'y'),	</a:t>
+            </a:r>
+            <a:r>
+              <a:rPr lang="en-US" sz="1000" dirty="0" smtClean="0">
+                <a:latin typeface="Lucida Console" pitchFamily="49" charset="0"/>
+              </a:rPr>
+              <a:t>// 5</a:t>
+            </a:r>
+            <a:endParaRPr lang="ru-RU" sz="1000" dirty="0" smtClean="0">
+              <a:latin typeface="Lucida Console" pitchFamily="49" charset="0"/>
+            </a:endParaRPr>
+          </a:p>
+          <a:p>
+            <a:pPr>
+              <a:buNone/>
+            </a:pPr>
+            <a:r>
+              <a:rPr lang="en-US" sz="1000" dirty="0" smtClean="0">
+                <a:latin typeface="Lucida Console" pitchFamily="49" charset="0"/>
+              </a:rPr>
+              <a:t>	model.map('collection', "x[=1]", 'color') 		</a:t>
+            </a:r>
+            <a:r>
+              <a:rPr lang="en-US" sz="1000" dirty="0" smtClean="0">
+                <a:latin typeface="Lucida Console" pitchFamily="49" charset="0"/>
+              </a:rPr>
+              <a:t>// </a:t>
+            </a:r>
+            <a:r>
+              <a:rPr lang="en-US" sz="1000" dirty="0" err="1" smtClean="0">
+                <a:latin typeface="Lucida Console" pitchFamily="49" charset="0"/>
+              </a:rPr>
+              <a:t>blue,red</a:t>
+            </a:r>
+            <a:endParaRPr lang="ru-RU" sz="1000" dirty="0" smtClean="0">
+              <a:latin typeface="Lucida Console" pitchFamily="49" charset="0"/>
+            </a:endParaRPr>
+          </a:p>
+          <a:p>
+            <a:pPr>
+              <a:buNone/>
+            </a:pPr>
+            <a:r>
+              <a:rPr lang="en-US" sz="1000" dirty="0" smtClean="0">
+                <a:latin typeface="Lucida Console" pitchFamily="49" charset="0"/>
+              </a:rPr>
+              <a:t>].</a:t>
+            </a:r>
+            <a:r>
+              <a:rPr lang="en-US" sz="1000" dirty="0" smtClean="0">
+                <a:latin typeface="Lucida Console" pitchFamily="49" charset="0"/>
+              </a:rPr>
+              <a:t>join('\n</a:t>
+            </a:r>
+            <a:r>
+              <a:rPr lang="en-US" sz="1000" dirty="0" smtClean="0">
+                <a:latin typeface="Lucida Console" pitchFamily="49" charset="0"/>
+              </a:rPr>
+              <a:t>'));</a:t>
+            </a:r>
+            <a:endParaRPr lang="ru-RU" sz="1000" dirty="0" smtClean="0">
+              <a:latin typeface="Lucida Console" pitchFamily="49" charset="0"/>
+            </a:endParaRPr>
+          </a:p>
+          <a:p>
+            <a:pPr>
+              <a:buNone/>
+            </a:pPr>
+            <a:endParaRPr lang="ru-RU" sz="1000" dirty="0" smtClean="0">
+              <a:latin typeface="Lucida Console" pitchFamily="49" charset="0"/>
+            </a:endParaRPr>
+          </a:p>
+        </p:txBody>
+      </p:sp>
+    </p:spTree>
+  </p:cSld>
+  <p:clrMapOvr>
+    <a:masterClrMapping/>
+  </p:clrMapOvr>
+</p:sld>
+</file>
+
+<file path=ppt/slides/slide16.xml><?xml version="1.0" encoding="utf-8"?>
 <p:sld xmlns:a="http://schemas.openxmlformats.org/drawingml/2006/main" xmlns:r="http://schemas.openxmlformats.org/officeDocument/2006/relationships" xmlns:p="http://schemas.openxmlformats.org/presentationml/2006/main">
   <p:cSld>
     <p:spTree>
@@ -6327,15 +6654,7 @@
                 <a:cs typeface="Arial" pitchFamily="34" charset="0"/>
                 <a:hlinkClick r:id="rId3"/>
               </a:rPr>
-              <a:t>https://</a:t>
-            </a:r>
-            <a:r>
-              <a:rPr lang="en-US" sz="2000" dirty="0" smtClean="0">
-                <a:latin typeface="Arial" pitchFamily="34" charset="0"/>
-                <a:cs typeface="Arial" pitchFamily="34" charset="0"/>
-                <a:hlinkClick r:id="rId3"/>
-              </a:rPr>
-              <a:t>github.com/extensible/follow.js</a:t>
+              <a:t>https://github.com/extensible/follow.js</a:t>
             </a:r>
             <a:endParaRPr lang="en-US" sz="2000" dirty="0" smtClean="0">
               <a:latin typeface="Arial" pitchFamily="34" charset="0"/>
@@ -6513,7 +6832,7 @@
     </p:spTree>
     <p:extLst>
       <p:ext uri="{BB962C8B-B14F-4D97-AF65-F5344CB8AC3E}">
-        <p14:creationId xmlns="" xmlns:p14="http://schemas.microsoft.com/office/powerpoint/2010/main" val="3225218314"/>
+        <p14:creationId xmlns:p14="http://schemas.microsoft.com/office/powerpoint/2010/main" xmlns="" val="3225218314"/>
       </p:ext>
     </p:extLst>
   </p:cSld>
@@ -6842,7 +7161,7 @@
     </p:spTree>
     <p:extLst>
       <p:ext uri="{BB962C8B-B14F-4D97-AF65-F5344CB8AC3E}">
-        <p14:creationId xmlns="" xmlns:p14="http://schemas.microsoft.com/office/powerpoint/2010/main" val="3227252953"/>
+        <p14:creationId xmlns:p14="http://schemas.microsoft.com/office/powerpoint/2010/main" xmlns="" val="3227252953"/>
       </p:ext>
     </p:extLst>
   </p:cSld>

</xml_diff>